<commit_message>
Chap05: Picture and captions corrected.
</commit_message>
<xml_diff>
--- a/05-CrDyn/Pictures/DistantGap.pptx
+++ b/05-CrDyn/Pictures/DistantGap.pptx
@@ -7,14 +7,14 @@
   <p:sldIdLst>
     <p:sldId id="256" r:id="rId2"/>
   </p:sldIdLst>
-  <p:sldSz cx="9361488" cy="9361488"/>
+  <p:sldSz cx="9540875" cy="9612313"/>
   <p:notesSz cx="6858000" cy="9144000"/>
   <p:defaultTextStyle>
     <a:defPPr>
       <a:defRPr lang="fr-FR"/>
     </a:defPPr>
-    <a:lvl1pPr marL="0" algn="l" defTabSz="820717" rtl="0" eaLnBrk="1" latinLnBrk="0" hangingPunct="1">
-      <a:defRPr sz="1600" kern="1200">
+    <a:lvl1pPr marL="0" algn="l" defTabSz="836296" rtl="0" eaLnBrk="1" latinLnBrk="0" hangingPunct="1">
+      <a:defRPr sz="1700" kern="1200">
         <a:solidFill>
           <a:schemeClr val="tx1"/>
         </a:solidFill>
@@ -23,8 +23,8 @@
         <a:cs typeface="+mn-cs"/>
       </a:defRPr>
     </a:lvl1pPr>
-    <a:lvl2pPr marL="410359" algn="l" defTabSz="820717" rtl="0" eaLnBrk="1" latinLnBrk="0" hangingPunct="1">
-      <a:defRPr sz="1600" kern="1200">
+    <a:lvl2pPr marL="418149" algn="l" defTabSz="836296" rtl="0" eaLnBrk="1" latinLnBrk="0" hangingPunct="1">
+      <a:defRPr sz="1700" kern="1200">
         <a:solidFill>
           <a:schemeClr val="tx1"/>
         </a:solidFill>
@@ -33,8 +33,8 @@
         <a:cs typeface="+mn-cs"/>
       </a:defRPr>
     </a:lvl2pPr>
-    <a:lvl3pPr marL="820717" algn="l" defTabSz="820717" rtl="0" eaLnBrk="1" latinLnBrk="0" hangingPunct="1">
-      <a:defRPr sz="1600" kern="1200">
+    <a:lvl3pPr marL="836296" algn="l" defTabSz="836296" rtl="0" eaLnBrk="1" latinLnBrk="0" hangingPunct="1">
+      <a:defRPr sz="1700" kern="1200">
         <a:solidFill>
           <a:schemeClr val="tx1"/>
         </a:solidFill>
@@ -43,8 +43,8 @@
         <a:cs typeface="+mn-cs"/>
       </a:defRPr>
     </a:lvl3pPr>
-    <a:lvl4pPr marL="1231076" algn="l" defTabSz="820717" rtl="0" eaLnBrk="1" latinLnBrk="0" hangingPunct="1">
-      <a:defRPr sz="1600" kern="1200">
+    <a:lvl4pPr marL="1254444" algn="l" defTabSz="836296" rtl="0" eaLnBrk="1" latinLnBrk="0" hangingPunct="1">
+      <a:defRPr sz="1700" kern="1200">
         <a:solidFill>
           <a:schemeClr val="tx1"/>
         </a:solidFill>
@@ -53,8 +53,8 @@
         <a:cs typeface="+mn-cs"/>
       </a:defRPr>
     </a:lvl4pPr>
-    <a:lvl5pPr marL="1641434" algn="l" defTabSz="820717" rtl="0" eaLnBrk="1" latinLnBrk="0" hangingPunct="1">
-      <a:defRPr sz="1600" kern="1200">
+    <a:lvl5pPr marL="1672592" algn="l" defTabSz="836296" rtl="0" eaLnBrk="1" latinLnBrk="0" hangingPunct="1">
+      <a:defRPr sz="1700" kern="1200">
         <a:solidFill>
           <a:schemeClr val="tx1"/>
         </a:solidFill>
@@ -63,8 +63,8 @@
         <a:cs typeface="+mn-cs"/>
       </a:defRPr>
     </a:lvl5pPr>
-    <a:lvl6pPr marL="2051793" algn="l" defTabSz="820717" rtl="0" eaLnBrk="1" latinLnBrk="0" hangingPunct="1">
-      <a:defRPr sz="1600" kern="1200">
+    <a:lvl6pPr marL="2090740" algn="l" defTabSz="836296" rtl="0" eaLnBrk="1" latinLnBrk="0" hangingPunct="1">
+      <a:defRPr sz="1700" kern="1200">
         <a:solidFill>
           <a:schemeClr val="tx1"/>
         </a:solidFill>
@@ -73,8 +73,8 @@
         <a:cs typeface="+mn-cs"/>
       </a:defRPr>
     </a:lvl6pPr>
-    <a:lvl7pPr marL="2462152" algn="l" defTabSz="820717" rtl="0" eaLnBrk="1" latinLnBrk="0" hangingPunct="1">
-      <a:defRPr sz="1600" kern="1200">
+    <a:lvl7pPr marL="2508889" algn="l" defTabSz="836296" rtl="0" eaLnBrk="1" latinLnBrk="0" hangingPunct="1">
+      <a:defRPr sz="1700" kern="1200">
         <a:solidFill>
           <a:schemeClr val="tx1"/>
         </a:solidFill>
@@ -83,8 +83,8 @@
         <a:cs typeface="+mn-cs"/>
       </a:defRPr>
     </a:lvl7pPr>
-    <a:lvl8pPr marL="2872511" algn="l" defTabSz="820717" rtl="0" eaLnBrk="1" latinLnBrk="0" hangingPunct="1">
-      <a:defRPr sz="1600" kern="1200">
+    <a:lvl8pPr marL="2927036" algn="l" defTabSz="836296" rtl="0" eaLnBrk="1" latinLnBrk="0" hangingPunct="1">
+      <a:defRPr sz="1700" kern="1200">
         <a:solidFill>
           <a:schemeClr val="tx1"/>
         </a:solidFill>
@@ -93,8 +93,8 @@
         <a:cs typeface="+mn-cs"/>
       </a:defRPr>
     </a:lvl8pPr>
-    <a:lvl9pPr marL="3282870" algn="l" defTabSz="820717" rtl="0" eaLnBrk="1" latinLnBrk="0" hangingPunct="1">
-      <a:defRPr sz="1600" kern="1200">
+    <a:lvl9pPr marL="3345185" algn="l" defTabSz="836296" rtl="0" eaLnBrk="1" latinLnBrk="0" hangingPunct="1">
+      <a:defRPr sz="1700" kern="1200">
         <a:solidFill>
           <a:schemeClr val="tx1"/>
         </a:solidFill>
@@ -136,8 +136,8 @@
         </p:nvSpPr>
         <p:spPr>
           <a:xfrm>
-            <a:off x="702116" y="2908131"/>
-            <a:ext cx="7957265" cy="2006651"/>
+            <a:off x="715571" y="2986051"/>
+            <a:ext cx="8109744" cy="2060416"/>
           </a:xfrm>
         </p:spPr>
         <p:txBody>
@@ -164,8 +164,8 @@
         </p:nvSpPr>
         <p:spPr>
           <a:xfrm>
-            <a:off x="1404224" y="5304845"/>
-            <a:ext cx="6553042" cy="2392382"/>
+            <a:off x="1431134" y="5446980"/>
+            <a:ext cx="6678613" cy="2456482"/>
           </a:xfrm>
         </p:spPr>
         <p:txBody>
@@ -181,7 +181,7 @@
                 </a:solidFill>
               </a:defRPr>
             </a:lvl1pPr>
-            <a:lvl2pPr marL="410359" indent="0" algn="ctr">
+            <a:lvl2pPr marL="418149" indent="0" algn="ctr">
               <a:buNone/>
               <a:defRPr>
                 <a:solidFill>
@@ -191,7 +191,7 @@
                 </a:solidFill>
               </a:defRPr>
             </a:lvl2pPr>
-            <a:lvl3pPr marL="820717" indent="0" algn="ctr">
+            <a:lvl3pPr marL="836296" indent="0" algn="ctr">
               <a:buNone/>
               <a:defRPr>
                 <a:solidFill>
@@ -201,7 +201,7 @@
                 </a:solidFill>
               </a:defRPr>
             </a:lvl3pPr>
-            <a:lvl4pPr marL="1231076" indent="0" algn="ctr">
+            <a:lvl4pPr marL="1254444" indent="0" algn="ctr">
               <a:buNone/>
               <a:defRPr>
                 <a:solidFill>
@@ -211,7 +211,7 @@
                 </a:solidFill>
               </a:defRPr>
             </a:lvl4pPr>
-            <a:lvl5pPr marL="1641434" indent="0" algn="ctr">
+            <a:lvl5pPr marL="1672592" indent="0" algn="ctr">
               <a:buNone/>
               <a:defRPr>
                 <a:solidFill>
@@ -221,7 +221,7 @@
                 </a:solidFill>
               </a:defRPr>
             </a:lvl5pPr>
-            <a:lvl6pPr marL="2051793" indent="0" algn="ctr">
+            <a:lvl6pPr marL="2090740" indent="0" algn="ctr">
               <a:buNone/>
               <a:defRPr>
                 <a:solidFill>
@@ -231,7 +231,7 @@
                 </a:solidFill>
               </a:defRPr>
             </a:lvl6pPr>
-            <a:lvl7pPr marL="2462152" indent="0" algn="ctr">
+            <a:lvl7pPr marL="2508889" indent="0" algn="ctr">
               <a:buNone/>
               <a:defRPr>
                 <a:solidFill>
@@ -241,7 +241,7 @@
                 </a:solidFill>
               </a:defRPr>
             </a:lvl7pPr>
-            <a:lvl8pPr marL="2872511" indent="0" algn="ctr">
+            <a:lvl8pPr marL="2927036" indent="0" algn="ctr">
               <a:buNone/>
               <a:defRPr>
                 <a:solidFill>
@@ -251,7 +251,7 @@
                 </a:solidFill>
               </a:defRPr>
             </a:lvl8pPr>
-            <a:lvl9pPr marL="3282870" indent="0" algn="ctr">
+            <a:lvl9pPr marL="3345185" indent="0" algn="ctr">
               <a:buNone/>
               <a:defRPr>
                 <a:solidFill>
@@ -288,7 +288,7 @@
           <a:p>
             <a:fld id="{E02029C7-0013-41CD-AA45-5AC734C7F128}" type="datetimeFigureOut">
               <a:rPr lang="fr-FR" smtClean="0"/>
-              <a:t>03/07/2017</a:t>
+              <a:t>04/07/2017</a:t>
             </a:fld>
             <a:endParaRPr lang="fr-FR"/>
           </a:p>
@@ -458,7 +458,7 @@
           <a:p>
             <a:fld id="{E02029C7-0013-41CD-AA45-5AC734C7F128}" type="datetimeFigureOut">
               <a:rPr lang="fr-FR" smtClean="0"/>
-              <a:t>03/07/2017</a:t>
+              <a:t>04/07/2017</a:t>
             </a:fld>
             <a:endParaRPr lang="fr-FR"/>
           </a:p>
@@ -548,8 +548,8 @@
         </p:nvSpPr>
         <p:spPr>
           <a:xfrm>
-            <a:off x="6787083" y="374896"/>
-            <a:ext cx="2106335" cy="7987602"/>
+            <a:off x="6917140" y="384940"/>
+            <a:ext cx="2146697" cy="8201617"/>
           </a:xfrm>
         </p:spPr>
         <p:txBody>
@@ -576,8 +576,8 @@
         </p:nvSpPr>
         <p:spPr>
           <a:xfrm>
-            <a:off x="468073" y="374896"/>
-            <a:ext cx="6162980" cy="7987602"/>
+            <a:off x="477042" y="384940"/>
+            <a:ext cx="6281076" cy="8201617"/>
           </a:xfrm>
         </p:spPr>
         <p:txBody>
@@ -638,7 +638,7 @@
           <a:p>
             <a:fld id="{E02029C7-0013-41CD-AA45-5AC734C7F128}" type="datetimeFigureOut">
               <a:rPr lang="fr-FR" smtClean="0"/>
-              <a:t>03/07/2017</a:t>
+              <a:t>04/07/2017</a:t>
             </a:fld>
             <a:endParaRPr lang="fr-FR"/>
           </a:p>
@@ -808,7 +808,7 @@
           <a:p>
             <a:fld id="{E02029C7-0013-41CD-AA45-5AC734C7F128}" type="datetimeFigureOut">
               <a:rPr lang="fr-FR" smtClean="0"/>
-              <a:t>03/07/2017</a:t>
+              <a:t>04/07/2017</a:t>
             </a:fld>
             <a:endParaRPr lang="fr-FR"/>
           </a:p>
@@ -898,8 +898,8 @@
         </p:nvSpPr>
         <p:spPr>
           <a:xfrm>
-            <a:off x="739498" y="6015622"/>
-            <a:ext cx="7957265" cy="1859296"/>
+            <a:off x="753670" y="6176801"/>
+            <a:ext cx="8109744" cy="1909112"/>
           </a:xfrm>
         </p:spPr>
         <p:txBody>
@@ -930,8 +930,8 @@
         </p:nvSpPr>
         <p:spPr>
           <a:xfrm>
-            <a:off x="739498" y="3967801"/>
-            <a:ext cx="7957265" cy="2047824"/>
+            <a:off x="753670" y="4074112"/>
+            <a:ext cx="8109744" cy="2102692"/>
           </a:xfrm>
         </p:spPr>
         <p:txBody>
@@ -939,7 +939,7 @@
           <a:lstStyle>
             <a:lvl1pPr marL="0" indent="0">
               <a:buNone/>
-              <a:defRPr sz="1800">
+              <a:defRPr sz="1900">
                 <a:solidFill>
                   <a:schemeClr val="tx1">
                     <a:tint val="75000"/>
@@ -947,9 +947,9 @@
                 </a:solidFill>
               </a:defRPr>
             </a:lvl1pPr>
-            <a:lvl2pPr marL="410359" indent="0">
-              <a:buNone/>
-              <a:defRPr sz="1600">
+            <a:lvl2pPr marL="418149" indent="0">
+              <a:buNone/>
+              <a:defRPr sz="1700">
                 <a:solidFill>
                   <a:schemeClr val="tx1">
                     <a:tint val="75000"/>
@@ -957,9 +957,9 @@
                 </a:solidFill>
               </a:defRPr>
             </a:lvl2pPr>
-            <a:lvl3pPr marL="820717" indent="0">
-              <a:buNone/>
-              <a:defRPr sz="1400">
+            <a:lvl3pPr marL="836296" indent="0">
+              <a:buNone/>
+              <a:defRPr sz="1500">
                 <a:solidFill>
                   <a:schemeClr val="tx1">
                     <a:tint val="75000"/>
@@ -967,7 +967,7 @@
                 </a:solidFill>
               </a:defRPr>
             </a:lvl3pPr>
-            <a:lvl4pPr marL="1231076" indent="0">
+            <a:lvl4pPr marL="1254444" indent="0">
               <a:buNone/>
               <a:defRPr sz="1200">
                 <a:solidFill>
@@ -977,7 +977,7 @@
                 </a:solidFill>
               </a:defRPr>
             </a:lvl4pPr>
-            <a:lvl5pPr marL="1641434" indent="0">
+            <a:lvl5pPr marL="1672592" indent="0">
               <a:buNone/>
               <a:defRPr sz="1200">
                 <a:solidFill>
@@ -987,7 +987,7 @@
                 </a:solidFill>
               </a:defRPr>
             </a:lvl5pPr>
-            <a:lvl6pPr marL="2051793" indent="0">
+            <a:lvl6pPr marL="2090740" indent="0">
               <a:buNone/>
               <a:defRPr sz="1200">
                 <a:solidFill>
@@ -997,7 +997,7 @@
                 </a:solidFill>
               </a:defRPr>
             </a:lvl6pPr>
-            <a:lvl7pPr marL="2462152" indent="0">
+            <a:lvl7pPr marL="2508889" indent="0">
               <a:buNone/>
               <a:defRPr sz="1200">
                 <a:solidFill>
@@ -1007,7 +1007,7 @@
                 </a:solidFill>
               </a:defRPr>
             </a:lvl7pPr>
-            <a:lvl8pPr marL="2872511" indent="0">
+            <a:lvl8pPr marL="2927036" indent="0">
               <a:buNone/>
               <a:defRPr sz="1200">
                 <a:solidFill>
@@ -1017,7 +1017,7 @@
                 </a:solidFill>
               </a:defRPr>
             </a:lvl8pPr>
-            <a:lvl9pPr marL="3282870" indent="0">
+            <a:lvl9pPr marL="3345185" indent="0">
               <a:buNone/>
               <a:defRPr sz="1200">
                 <a:solidFill>
@@ -1054,7 +1054,7 @@
           <a:p>
             <a:fld id="{E02029C7-0013-41CD-AA45-5AC734C7F128}" type="datetimeFigureOut">
               <a:rPr lang="fr-FR" smtClean="0"/>
-              <a:t>03/07/2017</a:t>
+              <a:t>04/07/2017</a:t>
             </a:fld>
             <a:endParaRPr lang="fr-FR"/>
           </a:p>
@@ -1167,39 +1167,39 @@
         </p:nvSpPr>
         <p:spPr>
           <a:xfrm>
-            <a:off x="468078" y="2184349"/>
-            <a:ext cx="4134657" cy="6178150"/>
+            <a:off x="477049" y="2242875"/>
+            <a:ext cx="4213886" cy="6343683"/>
           </a:xfrm>
         </p:spPr>
         <p:txBody>
           <a:bodyPr/>
           <a:lstStyle>
             <a:lvl1pPr>
-              <a:defRPr sz="2500"/>
+              <a:defRPr sz="2600"/>
             </a:lvl1pPr>
             <a:lvl2pPr>
-              <a:defRPr sz="2200"/>
+              <a:defRPr sz="2300"/>
             </a:lvl2pPr>
             <a:lvl3pPr>
-              <a:defRPr sz="1800"/>
+              <a:defRPr sz="1900"/>
             </a:lvl3pPr>
             <a:lvl4pPr>
-              <a:defRPr sz="1600"/>
+              <a:defRPr sz="1700"/>
             </a:lvl4pPr>
             <a:lvl5pPr>
-              <a:defRPr sz="1600"/>
+              <a:defRPr sz="1700"/>
             </a:lvl5pPr>
             <a:lvl6pPr>
-              <a:defRPr sz="1600"/>
+              <a:defRPr sz="1700"/>
             </a:lvl6pPr>
             <a:lvl7pPr>
-              <a:defRPr sz="1600"/>
+              <a:defRPr sz="1700"/>
             </a:lvl7pPr>
             <a:lvl8pPr>
-              <a:defRPr sz="1600"/>
+              <a:defRPr sz="1700"/>
             </a:lvl8pPr>
             <a:lvl9pPr>
-              <a:defRPr sz="1600"/>
+              <a:defRPr sz="1700"/>
             </a:lvl9pPr>
           </a:lstStyle>
           <a:p>
@@ -1252,39 +1252,39 @@
         </p:nvSpPr>
         <p:spPr>
           <a:xfrm>
-            <a:off x="4758760" y="2184349"/>
-            <a:ext cx="4134657" cy="6178150"/>
+            <a:off x="4849950" y="2242875"/>
+            <a:ext cx="4213886" cy="6343683"/>
           </a:xfrm>
         </p:spPr>
         <p:txBody>
           <a:bodyPr/>
           <a:lstStyle>
             <a:lvl1pPr>
-              <a:defRPr sz="2500"/>
+              <a:defRPr sz="2600"/>
             </a:lvl1pPr>
             <a:lvl2pPr>
-              <a:defRPr sz="2200"/>
+              <a:defRPr sz="2300"/>
             </a:lvl2pPr>
             <a:lvl3pPr>
-              <a:defRPr sz="1800"/>
+              <a:defRPr sz="1900"/>
             </a:lvl3pPr>
             <a:lvl4pPr>
-              <a:defRPr sz="1600"/>
+              <a:defRPr sz="1700"/>
             </a:lvl4pPr>
             <a:lvl5pPr>
-              <a:defRPr sz="1600"/>
+              <a:defRPr sz="1700"/>
             </a:lvl5pPr>
             <a:lvl6pPr>
-              <a:defRPr sz="1600"/>
+              <a:defRPr sz="1700"/>
             </a:lvl6pPr>
             <a:lvl7pPr>
-              <a:defRPr sz="1600"/>
+              <a:defRPr sz="1700"/>
             </a:lvl7pPr>
             <a:lvl8pPr>
-              <a:defRPr sz="1600"/>
+              <a:defRPr sz="1700"/>
             </a:lvl8pPr>
             <a:lvl9pPr>
-              <a:defRPr sz="1600"/>
+              <a:defRPr sz="1700"/>
             </a:lvl9pPr>
           </a:lstStyle>
           <a:p>
@@ -1342,7 +1342,7 @@
           <a:p>
             <a:fld id="{E02029C7-0013-41CD-AA45-5AC734C7F128}" type="datetimeFigureOut">
               <a:rPr lang="fr-FR" smtClean="0"/>
-              <a:t>03/07/2017</a:t>
+              <a:t>04/07/2017</a:t>
             </a:fld>
             <a:endParaRPr lang="fr-FR"/>
           </a:p>
@@ -1459,8 +1459,8 @@
         </p:nvSpPr>
         <p:spPr>
           <a:xfrm>
-            <a:off x="468080" y="2095503"/>
-            <a:ext cx="4136283" cy="873306"/>
+            <a:off x="477052" y="2151650"/>
+            <a:ext cx="4215543" cy="896704"/>
           </a:xfrm>
         </p:spPr>
         <p:txBody>
@@ -1468,39 +1468,39 @@
           <a:lstStyle>
             <a:lvl1pPr marL="0" indent="0">
               <a:buNone/>
-              <a:defRPr sz="2200" b="1"/>
+              <a:defRPr sz="2300" b="1"/>
             </a:lvl1pPr>
-            <a:lvl2pPr marL="410359" indent="0">
-              <a:buNone/>
-              <a:defRPr sz="1800" b="1"/>
+            <a:lvl2pPr marL="418149" indent="0">
+              <a:buNone/>
+              <a:defRPr sz="1900" b="1"/>
             </a:lvl2pPr>
-            <a:lvl3pPr marL="820717" indent="0">
-              <a:buNone/>
-              <a:defRPr sz="1600" b="1"/>
+            <a:lvl3pPr marL="836296" indent="0">
+              <a:buNone/>
+              <a:defRPr sz="1700" b="1"/>
             </a:lvl3pPr>
-            <a:lvl4pPr marL="1231076" indent="0">
-              <a:buNone/>
-              <a:defRPr sz="1400" b="1"/>
+            <a:lvl4pPr marL="1254444" indent="0">
+              <a:buNone/>
+              <a:defRPr sz="1500" b="1"/>
             </a:lvl4pPr>
-            <a:lvl5pPr marL="1641434" indent="0">
-              <a:buNone/>
-              <a:defRPr sz="1400" b="1"/>
+            <a:lvl5pPr marL="1672592" indent="0">
+              <a:buNone/>
+              <a:defRPr sz="1500" b="1"/>
             </a:lvl5pPr>
-            <a:lvl6pPr marL="2051793" indent="0">
-              <a:buNone/>
-              <a:defRPr sz="1400" b="1"/>
+            <a:lvl6pPr marL="2090740" indent="0">
+              <a:buNone/>
+              <a:defRPr sz="1500" b="1"/>
             </a:lvl6pPr>
-            <a:lvl7pPr marL="2462152" indent="0">
-              <a:buNone/>
-              <a:defRPr sz="1400" b="1"/>
+            <a:lvl7pPr marL="2508889" indent="0">
+              <a:buNone/>
+              <a:defRPr sz="1500" b="1"/>
             </a:lvl7pPr>
-            <a:lvl8pPr marL="2872511" indent="0">
-              <a:buNone/>
-              <a:defRPr sz="1400" b="1"/>
+            <a:lvl8pPr marL="2927036" indent="0">
+              <a:buNone/>
+              <a:defRPr sz="1500" b="1"/>
             </a:lvl8pPr>
-            <a:lvl9pPr marL="3282870" indent="0">
-              <a:buNone/>
-              <a:defRPr sz="1400" b="1"/>
+            <a:lvl9pPr marL="3345185" indent="0">
+              <a:buNone/>
+              <a:defRPr sz="1500" b="1"/>
             </a:lvl9pPr>
           </a:lstStyle>
           <a:p>
@@ -1524,39 +1524,39 @@
         </p:nvSpPr>
         <p:spPr>
           <a:xfrm>
-            <a:off x="468080" y="2968809"/>
-            <a:ext cx="4136283" cy="5393691"/>
+            <a:off x="477052" y="3048353"/>
+            <a:ext cx="4215543" cy="5538206"/>
           </a:xfrm>
         </p:spPr>
         <p:txBody>
           <a:bodyPr/>
           <a:lstStyle>
             <a:lvl1pPr>
-              <a:defRPr sz="2200"/>
+              <a:defRPr sz="2300"/>
             </a:lvl1pPr>
             <a:lvl2pPr>
-              <a:defRPr sz="1800"/>
+              <a:defRPr sz="1900"/>
             </a:lvl2pPr>
             <a:lvl3pPr>
-              <a:defRPr sz="1600"/>
+              <a:defRPr sz="1700"/>
             </a:lvl3pPr>
             <a:lvl4pPr>
-              <a:defRPr sz="1400"/>
+              <a:defRPr sz="1500"/>
             </a:lvl4pPr>
             <a:lvl5pPr>
-              <a:defRPr sz="1400"/>
+              <a:defRPr sz="1500"/>
             </a:lvl5pPr>
             <a:lvl6pPr>
-              <a:defRPr sz="1400"/>
+              <a:defRPr sz="1500"/>
             </a:lvl6pPr>
             <a:lvl7pPr>
-              <a:defRPr sz="1400"/>
+              <a:defRPr sz="1500"/>
             </a:lvl7pPr>
             <a:lvl8pPr>
-              <a:defRPr sz="1400"/>
+              <a:defRPr sz="1500"/>
             </a:lvl8pPr>
             <a:lvl9pPr>
-              <a:defRPr sz="1400"/>
+              <a:defRPr sz="1500"/>
             </a:lvl9pPr>
           </a:lstStyle>
           <a:p>
@@ -1609,8 +1609,8 @@
         </p:nvSpPr>
         <p:spPr>
           <a:xfrm>
-            <a:off x="4755506" y="2095503"/>
-            <a:ext cx="4137908" cy="873306"/>
+            <a:off x="4846632" y="2151650"/>
+            <a:ext cx="4217200" cy="896704"/>
           </a:xfrm>
         </p:spPr>
         <p:txBody>
@@ -1618,39 +1618,39 @@
           <a:lstStyle>
             <a:lvl1pPr marL="0" indent="0">
               <a:buNone/>
-              <a:defRPr sz="2200" b="1"/>
+              <a:defRPr sz="2300" b="1"/>
             </a:lvl1pPr>
-            <a:lvl2pPr marL="410359" indent="0">
-              <a:buNone/>
-              <a:defRPr sz="1800" b="1"/>
+            <a:lvl2pPr marL="418149" indent="0">
+              <a:buNone/>
+              <a:defRPr sz="1900" b="1"/>
             </a:lvl2pPr>
-            <a:lvl3pPr marL="820717" indent="0">
-              <a:buNone/>
-              <a:defRPr sz="1600" b="1"/>
+            <a:lvl3pPr marL="836296" indent="0">
+              <a:buNone/>
+              <a:defRPr sz="1700" b="1"/>
             </a:lvl3pPr>
-            <a:lvl4pPr marL="1231076" indent="0">
-              <a:buNone/>
-              <a:defRPr sz="1400" b="1"/>
+            <a:lvl4pPr marL="1254444" indent="0">
+              <a:buNone/>
+              <a:defRPr sz="1500" b="1"/>
             </a:lvl4pPr>
-            <a:lvl5pPr marL="1641434" indent="0">
-              <a:buNone/>
-              <a:defRPr sz="1400" b="1"/>
+            <a:lvl5pPr marL="1672592" indent="0">
+              <a:buNone/>
+              <a:defRPr sz="1500" b="1"/>
             </a:lvl5pPr>
-            <a:lvl6pPr marL="2051793" indent="0">
-              <a:buNone/>
-              <a:defRPr sz="1400" b="1"/>
+            <a:lvl6pPr marL="2090740" indent="0">
+              <a:buNone/>
+              <a:defRPr sz="1500" b="1"/>
             </a:lvl6pPr>
-            <a:lvl7pPr marL="2462152" indent="0">
-              <a:buNone/>
-              <a:defRPr sz="1400" b="1"/>
+            <a:lvl7pPr marL="2508889" indent="0">
+              <a:buNone/>
+              <a:defRPr sz="1500" b="1"/>
             </a:lvl7pPr>
-            <a:lvl8pPr marL="2872511" indent="0">
-              <a:buNone/>
-              <a:defRPr sz="1400" b="1"/>
+            <a:lvl8pPr marL="2927036" indent="0">
+              <a:buNone/>
+              <a:defRPr sz="1500" b="1"/>
             </a:lvl8pPr>
-            <a:lvl9pPr marL="3282870" indent="0">
-              <a:buNone/>
-              <a:defRPr sz="1400" b="1"/>
+            <a:lvl9pPr marL="3345185" indent="0">
+              <a:buNone/>
+              <a:defRPr sz="1500" b="1"/>
             </a:lvl9pPr>
           </a:lstStyle>
           <a:p>
@@ -1674,39 +1674,39 @@
         </p:nvSpPr>
         <p:spPr>
           <a:xfrm>
-            <a:off x="4755506" y="2968809"/>
-            <a:ext cx="4137908" cy="5393691"/>
+            <a:off x="4846632" y="3048353"/>
+            <a:ext cx="4217200" cy="5538206"/>
           </a:xfrm>
         </p:spPr>
         <p:txBody>
           <a:bodyPr/>
           <a:lstStyle>
             <a:lvl1pPr>
-              <a:defRPr sz="2200"/>
+              <a:defRPr sz="2300"/>
             </a:lvl1pPr>
             <a:lvl2pPr>
-              <a:defRPr sz="1800"/>
+              <a:defRPr sz="1900"/>
             </a:lvl2pPr>
             <a:lvl3pPr>
-              <a:defRPr sz="1600"/>
+              <a:defRPr sz="1700"/>
             </a:lvl3pPr>
             <a:lvl4pPr>
-              <a:defRPr sz="1400"/>
+              <a:defRPr sz="1500"/>
             </a:lvl4pPr>
             <a:lvl5pPr>
-              <a:defRPr sz="1400"/>
+              <a:defRPr sz="1500"/>
             </a:lvl5pPr>
             <a:lvl6pPr>
-              <a:defRPr sz="1400"/>
+              <a:defRPr sz="1500"/>
             </a:lvl6pPr>
             <a:lvl7pPr>
-              <a:defRPr sz="1400"/>
+              <a:defRPr sz="1500"/>
             </a:lvl7pPr>
             <a:lvl8pPr>
-              <a:defRPr sz="1400"/>
+              <a:defRPr sz="1500"/>
             </a:lvl8pPr>
             <a:lvl9pPr>
-              <a:defRPr sz="1400"/>
+              <a:defRPr sz="1500"/>
             </a:lvl9pPr>
           </a:lstStyle>
           <a:p>
@@ -1764,7 +1764,7 @@
           <a:p>
             <a:fld id="{E02029C7-0013-41CD-AA45-5AC734C7F128}" type="datetimeFigureOut">
               <a:rPr lang="fr-FR" smtClean="0"/>
-              <a:t>03/07/2017</a:t>
+              <a:t>04/07/2017</a:t>
             </a:fld>
             <a:endParaRPr lang="fr-FR"/>
           </a:p>
@@ -1882,7 +1882,7 @@
           <a:p>
             <a:fld id="{E02029C7-0013-41CD-AA45-5AC734C7F128}" type="datetimeFigureOut">
               <a:rPr lang="fr-FR" smtClean="0"/>
-              <a:t>03/07/2017</a:t>
+              <a:t>04/07/2017</a:t>
             </a:fld>
             <a:endParaRPr lang="fr-FR"/>
           </a:p>
@@ -1977,7 +1977,7 @@
           <a:p>
             <a:fld id="{E02029C7-0013-41CD-AA45-5AC734C7F128}" type="datetimeFigureOut">
               <a:rPr lang="fr-FR" smtClean="0"/>
-              <a:t>03/07/2017</a:t>
+              <a:t>04/07/2017</a:t>
             </a:fld>
             <a:endParaRPr lang="fr-FR"/>
           </a:p>
@@ -2067,15 +2067,15 @@
         </p:nvSpPr>
         <p:spPr>
           <a:xfrm>
-            <a:off x="468079" y="372729"/>
-            <a:ext cx="3079865" cy="1586250"/>
+            <a:off x="477049" y="382716"/>
+            <a:ext cx="3138882" cy="1628751"/>
           </a:xfrm>
         </p:spPr>
         <p:txBody>
           <a:bodyPr anchor="b"/>
           <a:lstStyle>
             <a:lvl1pPr algn="l">
-              <a:defRPr sz="1800" b="1"/>
+              <a:defRPr sz="1900" b="1"/>
             </a:lvl1pPr>
           </a:lstStyle>
           <a:p>
@@ -2099,8 +2099,8 @@
         </p:nvSpPr>
         <p:spPr>
           <a:xfrm>
-            <a:off x="3660082" y="372729"/>
-            <a:ext cx="5233332" cy="7989769"/>
+            <a:off x="3730218" y="382716"/>
+            <a:ext cx="5333614" cy="8203841"/>
           </a:xfrm>
         </p:spPr>
         <p:txBody>
@@ -2110,28 +2110,28 @@
               <a:defRPr sz="2900"/>
             </a:lvl1pPr>
             <a:lvl2pPr>
-              <a:defRPr sz="2500"/>
+              <a:defRPr sz="2600"/>
             </a:lvl2pPr>
             <a:lvl3pPr>
-              <a:defRPr sz="2200"/>
+              <a:defRPr sz="2300"/>
             </a:lvl3pPr>
             <a:lvl4pPr>
-              <a:defRPr sz="1800"/>
+              <a:defRPr sz="1900"/>
             </a:lvl4pPr>
             <a:lvl5pPr>
-              <a:defRPr sz="1800"/>
+              <a:defRPr sz="1900"/>
             </a:lvl5pPr>
             <a:lvl6pPr>
-              <a:defRPr sz="1800"/>
+              <a:defRPr sz="1900"/>
             </a:lvl6pPr>
             <a:lvl7pPr>
-              <a:defRPr sz="1800"/>
+              <a:defRPr sz="1900"/>
             </a:lvl7pPr>
             <a:lvl8pPr>
-              <a:defRPr sz="1800"/>
+              <a:defRPr sz="1900"/>
             </a:lvl8pPr>
             <a:lvl9pPr>
-              <a:defRPr sz="1800"/>
+              <a:defRPr sz="1900"/>
             </a:lvl9pPr>
           </a:lstStyle>
           <a:p>
@@ -2184,8 +2184,8 @@
         </p:nvSpPr>
         <p:spPr>
           <a:xfrm>
-            <a:off x="468079" y="1958980"/>
-            <a:ext cx="3079865" cy="6403518"/>
+            <a:off x="477049" y="2011467"/>
+            <a:ext cx="3138882" cy="6575090"/>
           </a:xfrm>
         </p:spPr>
         <p:txBody>
@@ -2195,35 +2195,35 @@
               <a:buNone/>
               <a:defRPr sz="1200"/>
             </a:lvl1pPr>
-            <a:lvl2pPr marL="410359" indent="0">
+            <a:lvl2pPr marL="418149" indent="0">
               <a:buNone/>
               <a:defRPr sz="1000"/>
             </a:lvl2pPr>
-            <a:lvl3pPr marL="820717" indent="0">
+            <a:lvl3pPr marL="836296" indent="0">
               <a:buNone/>
               <a:defRPr sz="900"/>
             </a:lvl3pPr>
-            <a:lvl4pPr marL="1231076" indent="0">
+            <a:lvl4pPr marL="1254444" indent="0">
               <a:buNone/>
               <a:defRPr sz="800"/>
             </a:lvl4pPr>
-            <a:lvl5pPr marL="1641434" indent="0">
+            <a:lvl5pPr marL="1672592" indent="0">
               <a:buNone/>
               <a:defRPr sz="800"/>
             </a:lvl5pPr>
-            <a:lvl6pPr marL="2051793" indent="0">
+            <a:lvl6pPr marL="2090740" indent="0">
               <a:buNone/>
               <a:defRPr sz="800"/>
             </a:lvl6pPr>
-            <a:lvl7pPr marL="2462152" indent="0">
+            <a:lvl7pPr marL="2508889" indent="0">
               <a:buNone/>
               <a:defRPr sz="800"/>
             </a:lvl7pPr>
-            <a:lvl8pPr marL="2872511" indent="0">
+            <a:lvl8pPr marL="2927036" indent="0">
               <a:buNone/>
               <a:defRPr sz="800"/>
             </a:lvl8pPr>
-            <a:lvl9pPr marL="3282870" indent="0">
+            <a:lvl9pPr marL="3345185" indent="0">
               <a:buNone/>
               <a:defRPr sz="800"/>
             </a:lvl9pPr>
@@ -2254,7 +2254,7 @@
           <a:p>
             <a:fld id="{E02029C7-0013-41CD-AA45-5AC734C7F128}" type="datetimeFigureOut">
               <a:rPr lang="fr-FR" smtClean="0"/>
-              <a:t>03/07/2017</a:t>
+              <a:t>04/07/2017</a:t>
             </a:fld>
             <a:endParaRPr lang="fr-FR"/>
           </a:p>
@@ -2344,15 +2344,15 @@
         </p:nvSpPr>
         <p:spPr>
           <a:xfrm>
-            <a:off x="1834922" y="6553042"/>
-            <a:ext cx="5616893" cy="773624"/>
+            <a:off x="1870085" y="6728619"/>
+            <a:ext cx="5724525" cy="794352"/>
           </a:xfrm>
         </p:spPr>
         <p:txBody>
           <a:bodyPr anchor="b"/>
           <a:lstStyle>
             <a:lvl1pPr algn="l">
-              <a:defRPr sz="1800" b="1"/>
+              <a:defRPr sz="1900" b="1"/>
             </a:lvl1pPr>
           </a:lstStyle>
           <a:p>
@@ -2376,8 +2376,8 @@
         </p:nvSpPr>
         <p:spPr>
           <a:xfrm>
-            <a:off x="1834922" y="836468"/>
-            <a:ext cx="5616893" cy="5616893"/>
+            <a:off x="1870085" y="858881"/>
+            <a:ext cx="5724525" cy="5767388"/>
           </a:xfrm>
         </p:spPr>
         <p:txBody>
@@ -2387,37 +2387,37 @@
               <a:buNone/>
               <a:defRPr sz="2900"/>
             </a:lvl1pPr>
-            <a:lvl2pPr marL="410359" indent="0">
-              <a:buNone/>
-              <a:defRPr sz="2500"/>
+            <a:lvl2pPr marL="418149" indent="0">
+              <a:buNone/>
+              <a:defRPr sz="2600"/>
             </a:lvl2pPr>
-            <a:lvl3pPr marL="820717" indent="0">
-              <a:buNone/>
-              <a:defRPr sz="2200"/>
+            <a:lvl3pPr marL="836296" indent="0">
+              <a:buNone/>
+              <a:defRPr sz="2300"/>
             </a:lvl3pPr>
-            <a:lvl4pPr marL="1231076" indent="0">
-              <a:buNone/>
-              <a:defRPr sz="1800"/>
+            <a:lvl4pPr marL="1254444" indent="0">
+              <a:buNone/>
+              <a:defRPr sz="1900"/>
             </a:lvl4pPr>
-            <a:lvl5pPr marL="1641434" indent="0">
-              <a:buNone/>
-              <a:defRPr sz="1800"/>
+            <a:lvl5pPr marL="1672592" indent="0">
+              <a:buNone/>
+              <a:defRPr sz="1900"/>
             </a:lvl5pPr>
-            <a:lvl6pPr marL="2051793" indent="0">
-              <a:buNone/>
-              <a:defRPr sz="1800"/>
+            <a:lvl6pPr marL="2090740" indent="0">
+              <a:buNone/>
+              <a:defRPr sz="1900"/>
             </a:lvl6pPr>
-            <a:lvl7pPr marL="2462152" indent="0">
-              <a:buNone/>
-              <a:defRPr sz="1800"/>
+            <a:lvl7pPr marL="2508889" indent="0">
+              <a:buNone/>
+              <a:defRPr sz="1900"/>
             </a:lvl7pPr>
-            <a:lvl8pPr marL="2872511" indent="0">
-              <a:buNone/>
-              <a:defRPr sz="1800"/>
+            <a:lvl8pPr marL="2927036" indent="0">
+              <a:buNone/>
+              <a:defRPr sz="1900"/>
             </a:lvl8pPr>
-            <a:lvl9pPr marL="3282870" indent="0">
-              <a:buNone/>
-              <a:defRPr sz="1800"/>
+            <a:lvl9pPr marL="3345185" indent="0">
+              <a:buNone/>
+              <a:defRPr sz="1900"/>
             </a:lvl9pPr>
           </a:lstStyle>
           <a:p>
@@ -2437,8 +2437,8 @@
         </p:nvSpPr>
         <p:spPr>
           <a:xfrm>
-            <a:off x="1834922" y="7326668"/>
-            <a:ext cx="5616893" cy="1098673"/>
+            <a:off x="1870085" y="7522974"/>
+            <a:ext cx="5724525" cy="1128110"/>
           </a:xfrm>
         </p:spPr>
         <p:txBody>
@@ -2448,35 +2448,35 @@
               <a:buNone/>
               <a:defRPr sz="1200"/>
             </a:lvl1pPr>
-            <a:lvl2pPr marL="410359" indent="0">
+            <a:lvl2pPr marL="418149" indent="0">
               <a:buNone/>
               <a:defRPr sz="1000"/>
             </a:lvl2pPr>
-            <a:lvl3pPr marL="820717" indent="0">
+            <a:lvl3pPr marL="836296" indent="0">
               <a:buNone/>
               <a:defRPr sz="900"/>
             </a:lvl3pPr>
-            <a:lvl4pPr marL="1231076" indent="0">
+            <a:lvl4pPr marL="1254444" indent="0">
               <a:buNone/>
               <a:defRPr sz="800"/>
             </a:lvl4pPr>
-            <a:lvl5pPr marL="1641434" indent="0">
+            <a:lvl5pPr marL="1672592" indent="0">
               <a:buNone/>
               <a:defRPr sz="800"/>
             </a:lvl5pPr>
-            <a:lvl6pPr marL="2051793" indent="0">
+            <a:lvl6pPr marL="2090740" indent="0">
               <a:buNone/>
               <a:defRPr sz="800"/>
             </a:lvl6pPr>
-            <a:lvl7pPr marL="2462152" indent="0">
+            <a:lvl7pPr marL="2508889" indent="0">
               <a:buNone/>
               <a:defRPr sz="800"/>
             </a:lvl7pPr>
-            <a:lvl8pPr marL="2872511" indent="0">
+            <a:lvl8pPr marL="2927036" indent="0">
               <a:buNone/>
               <a:defRPr sz="800"/>
             </a:lvl8pPr>
-            <a:lvl9pPr marL="3282870" indent="0">
+            <a:lvl9pPr marL="3345185" indent="0">
               <a:buNone/>
               <a:defRPr sz="800"/>
             </a:lvl9pPr>
@@ -2507,7 +2507,7 @@
           <a:p>
             <a:fld id="{E02029C7-0013-41CD-AA45-5AC734C7F128}" type="datetimeFigureOut">
               <a:rPr lang="fr-FR" smtClean="0"/>
-              <a:t>03/07/2017</a:t>
+              <a:t>04/07/2017</a:t>
             </a:fld>
             <a:endParaRPr lang="fr-FR"/>
           </a:p>
@@ -2602,15 +2602,15 @@
         </p:nvSpPr>
         <p:spPr>
           <a:xfrm>
-            <a:off x="468074" y="374896"/>
-            <a:ext cx="8425340" cy="1560247"/>
+            <a:off x="477044" y="384943"/>
+            <a:ext cx="8586788" cy="1602051"/>
           </a:xfrm>
           <a:prstGeom prst="rect">
             <a:avLst/>
           </a:prstGeom>
         </p:spPr>
         <p:txBody>
-          <a:bodyPr vert="horz" lIns="82072" tIns="41036" rIns="82072" bIns="41036" rtlCol="0" anchor="ctr">
+          <a:bodyPr vert="horz" lIns="83630" tIns="41815" rIns="83630" bIns="41815" rtlCol="0" anchor="ctr">
             <a:normAutofit/>
           </a:bodyPr>
           <a:lstStyle/>
@@ -2635,15 +2635,15 @@
         </p:nvSpPr>
         <p:spPr>
           <a:xfrm>
-            <a:off x="468074" y="2184349"/>
-            <a:ext cx="8425340" cy="6178150"/>
+            <a:off x="477044" y="2242875"/>
+            <a:ext cx="8586788" cy="6343683"/>
           </a:xfrm>
           <a:prstGeom prst="rect">
             <a:avLst/>
           </a:prstGeom>
         </p:spPr>
         <p:txBody>
-          <a:bodyPr vert="horz" lIns="82072" tIns="41036" rIns="82072" bIns="41036" rtlCol="0">
+          <a:bodyPr vert="horz" lIns="83630" tIns="41815" rIns="83630" bIns="41815" rtlCol="0">
             <a:normAutofit/>
           </a:bodyPr>
           <a:lstStyle/>
@@ -2697,15 +2697,15 @@
         </p:nvSpPr>
         <p:spPr>
           <a:xfrm>
-            <a:off x="468076" y="8676716"/>
-            <a:ext cx="2184347" cy="498412"/>
+            <a:off x="477046" y="8909194"/>
+            <a:ext cx="2226204" cy="511766"/>
           </a:xfrm>
           <a:prstGeom prst="rect">
             <a:avLst/>
           </a:prstGeom>
         </p:spPr>
         <p:txBody>
-          <a:bodyPr vert="horz" lIns="82072" tIns="41036" rIns="82072" bIns="41036" rtlCol="0" anchor="ctr"/>
+          <a:bodyPr vert="horz" lIns="83630" tIns="41815" rIns="83630" bIns="41815" rtlCol="0" anchor="ctr"/>
           <a:lstStyle>
             <a:lvl1pPr algn="l">
               <a:defRPr sz="1000">
@@ -2720,7 +2720,7 @@
           <a:p>
             <a:fld id="{E02029C7-0013-41CD-AA45-5AC734C7F128}" type="datetimeFigureOut">
               <a:rPr lang="fr-FR" smtClean="0"/>
-              <a:t>03/07/2017</a:t>
+              <a:t>04/07/2017</a:t>
             </a:fld>
             <a:endParaRPr lang="fr-FR"/>
           </a:p>
@@ -2738,15 +2738,15 @@
         </p:nvSpPr>
         <p:spPr>
           <a:xfrm>
-            <a:off x="3198513" y="8676716"/>
-            <a:ext cx="2964471" cy="498412"/>
+            <a:off x="3259805" y="8909194"/>
+            <a:ext cx="3021277" cy="511766"/>
           </a:xfrm>
           <a:prstGeom prst="rect">
             <a:avLst/>
           </a:prstGeom>
         </p:spPr>
         <p:txBody>
-          <a:bodyPr vert="horz" lIns="82072" tIns="41036" rIns="82072" bIns="41036" rtlCol="0" anchor="ctr"/>
+          <a:bodyPr vert="horz" lIns="83630" tIns="41815" rIns="83630" bIns="41815" rtlCol="0" anchor="ctr"/>
           <a:lstStyle>
             <a:lvl1pPr algn="ctr">
               <a:defRPr sz="1000">
@@ -2775,15 +2775,15 @@
         </p:nvSpPr>
         <p:spPr>
           <a:xfrm>
-            <a:off x="6709070" y="8676716"/>
-            <a:ext cx="2184347" cy="498412"/>
+            <a:off x="6837631" y="8909194"/>
+            <a:ext cx="2226204" cy="511766"/>
           </a:xfrm>
           <a:prstGeom prst="rect">
             <a:avLst/>
           </a:prstGeom>
         </p:spPr>
         <p:txBody>
-          <a:bodyPr vert="horz" lIns="82072" tIns="41036" rIns="82072" bIns="41036" rtlCol="0" anchor="ctr"/>
+          <a:bodyPr vert="horz" lIns="83630" tIns="41815" rIns="83630" bIns="41815" rtlCol="0" anchor="ctr"/>
           <a:lstStyle>
             <a:lvl1pPr algn="r">
               <a:defRPr sz="1000">
@@ -2827,7 +2827,7 @@
   </p:sldLayoutIdLst>
   <p:txStyles>
     <p:titleStyle>
-      <a:lvl1pPr algn="ctr" defTabSz="820717" rtl="0" eaLnBrk="1" latinLnBrk="0" hangingPunct="1">
+      <a:lvl1pPr algn="ctr" defTabSz="836296" rtl="0" eaLnBrk="1" latinLnBrk="0" hangingPunct="1">
         <a:spcBef>
           <a:spcPct val="0"/>
         </a:spcBef>
@@ -2843,7 +2843,7 @@
       </a:lvl1pPr>
     </p:titleStyle>
     <p:bodyStyle>
-      <a:lvl1pPr marL="307769" indent="-307769" algn="l" defTabSz="820717" rtl="0" eaLnBrk="1" latinLnBrk="0" hangingPunct="1">
+      <a:lvl1pPr marL="313611" indent="-313611" algn="l" defTabSz="836296" rtl="0" eaLnBrk="1" latinLnBrk="0" hangingPunct="1">
         <a:spcBef>
           <a:spcPct val="20000"/>
         </a:spcBef>
@@ -2858,13 +2858,13 @@
           <a:cs typeface="+mn-cs"/>
         </a:defRPr>
       </a:lvl1pPr>
-      <a:lvl2pPr marL="666833" indent="-256474" algn="l" defTabSz="820717" rtl="0" eaLnBrk="1" latinLnBrk="0" hangingPunct="1">
+      <a:lvl2pPr marL="679490" indent="-261343" algn="l" defTabSz="836296" rtl="0" eaLnBrk="1" latinLnBrk="0" hangingPunct="1">
         <a:spcBef>
           <a:spcPct val="20000"/>
         </a:spcBef>
         <a:buFont typeface="Arial" panose="020B0604020202020204" pitchFamily="34" charset="0"/>
         <a:buChar char="–"/>
-        <a:defRPr sz="2500" kern="1200">
+        <a:defRPr sz="2600" kern="1200">
           <a:solidFill>
             <a:schemeClr val="tx1"/>
           </a:solidFill>
@@ -2873,13 +2873,13 @@
           <a:cs typeface="+mn-cs"/>
         </a:defRPr>
       </a:lvl2pPr>
-      <a:lvl3pPr marL="1025897" indent="-205180" algn="l" defTabSz="820717" rtl="0" eaLnBrk="1" latinLnBrk="0" hangingPunct="1">
+      <a:lvl3pPr marL="1045370" indent="-209075" algn="l" defTabSz="836296" rtl="0" eaLnBrk="1" latinLnBrk="0" hangingPunct="1">
         <a:spcBef>
           <a:spcPct val="20000"/>
         </a:spcBef>
         <a:buFont typeface="Arial" panose="020B0604020202020204" pitchFamily="34" charset="0"/>
         <a:buChar char="•"/>
-        <a:defRPr sz="2200" kern="1200">
+        <a:defRPr sz="2300" kern="1200">
           <a:solidFill>
             <a:schemeClr val="tx1"/>
           </a:solidFill>
@@ -2888,13 +2888,13 @@
           <a:cs typeface="+mn-cs"/>
         </a:defRPr>
       </a:lvl3pPr>
-      <a:lvl4pPr marL="1436256" indent="-205180" algn="l" defTabSz="820717" rtl="0" eaLnBrk="1" latinLnBrk="0" hangingPunct="1">
+      <a:lvl4pPr marL="1463519" indent="-209075" algn="l" defTabSz="836296" rtl="0" eaLnBrk="1" latinLnBrk="0" hangingPunct="1">
         <a:spcBef>
           <a:spcPct val="20000"/>
         </a:spcBef>
         <a:buFont typeface="Arial" panose="020B0604020202020204" pitchFamily="34" charset="0"/>
         <a:buChar char="–"/>
-        <a:defRPr sz="1800" kern="1200">
+        <a:defRPr sz="1900" kern="1200">
           <a:solidFill>
             <a:schemeClr val="tx1"/>
           </a:solidFill>
@@ -2903,13 +2903,13 @@
           <a:cs typeface="+mn-cs"/>
         </a:defRPr>
       </a:lvl4pPr>
-      <a:lvl5pPr marL="1846614" indent="-205180" algn="l" defTabSz="820717" rtl="0" eaLnBrk="1" latinLnBrk="0" hangingPunct="1">
+      <a:lvl5pPr marL="1881666" indent="-209075" algn="l" defTabSz="836296" rtl="0" eaLnBrk="1" latinLnBrk="0" hangingPunct="1">
         <a:spcBef>
           <a:spcPct val="20000"/>
         </a:spcBef>
         <a:buFont typeface="Arial" panose="020B0604020202020204" pitchFamily="34" charset="0"/>
         <a:buChar char="»"/>
-        <a:defRPr sz="1800" kern="1200">
+        <a:defRPr sz="1900" kern="1200">
           <a:solidFill>
             <a:schemeClr val="tx1"/>
           </a:solidFill>
@@ -2918,13 +2918,13 @@
           <a:cs typeface="+mn-cs"/>
         </a:defRPr>
       </a:lvl5pPr>
-      <a:lvl6pPr marL="2256973" indent="-205180" algn="l" defTabSz="820717" rtl="0" eaLnBrk="1" latinLnBrk="0" hangingPunct="1">
+      <a:lvl6pPr marL="2299815" indent="-209075" algn="l" defTabSz="836296" rtl="0" eaLnBrk="1" latinLnBrk="0" hangingPunct="1">
         <a:spcBef>
           <a:spcPct val="20000"/>
         </a:spcBef>
         <a:buFont typeface="Arial" panose="020B0604020202020204" pitchFamily="34" charset="0"/>
         <a:buChar char="•"/>
-        <a:defRPr sz="1800" kern="1200">
+        <a:defRPr sz="1900" kern="1200">
           <a:solidFill>
             <a:schemeClr val="tx1"/>
           </a:solidFill>
@@ -2933,13 +2933,13 @@
           <a:cs typeface="+mn-cs"/>
         </a:defRPr>
       </a:lvl6pPr>
-      <a:lvl7pPr marL="2667331" indent="-205180" algn="l" defTabSz="820717" rtl="0" eaLnBrk="1" latinLnBrk="0" hangingPunct="1">
+      <a:lvl7pPr marL="2717963" indent="-209075" algn="l" defTabSz="836296" rtl="0" eaLnBrk="1" latinLnBrk="0" hangingPunct="1">
         <a:spcBef>
           <a:spcPct val="20000"/>
         </a:spcBef>
         <a:buFont typeface="Arial" panose="020B0604020202020204" pitchFamily="34" charset="0"/>
         <a:buChar char="•"/>
-        <a:defRPr sz="1800" kern="1200">
+        <a:defRPr sz="1900" kern="1200">
           <a:solidFill>
             <a:schemeClr val="tx1"/>
           </a:solidFill>
@@ -2948,13 +2948,13 @@
           <a:cs typeface="+mn-cs"/>
         </a:defRPr>
       </a:lvl7pPr>
-      <a:lvl8pPr marL="3077690" indent="-205180" algn="l" defTabSz="820717" rtl="0" eaLnBrk="1" latinLnBrk="0" hangingPunct="1">
+      <a:lvl8pPr marL="3136110" indent="-209075" algn="l" defTabSz="836296" rtl="0" eaLnBrk="1" latinLnBrk="0" hangingPunct="1">
         <a:spcBef>
           <a:spcPct val="20000"/>
         </a:spcBef>
         <a:buFont typeface="Arial" panose="020B0604020202020204" pitchFamily="34" charset="0"/>
         <a:buChar char="•"/>
-        <a:defRPr sz="1800" kern="1200">
+        <a:defRPr sz="1900" kern="1200">
           <a:solidFill>
             <a:schemeClr val="tx1"/>
           </a:solidFill>
@@ -2963,13 +2963,13 @@
           <a:cs typeface="+mn-cs"/>
         </a:defRPr>
       </a:lvl8pPr>
-      <a:lvl9pPr marL="3488049" indent="-205180" algn="l" defTabSz="820717" rtl="0" eaLnBrk="1" latinLnBrk="0" hangingPunct="1">
+      <a:lvl9pPr marL="3554259" indent="-209075" algn="l" defTabSz="836296" rtl="0" eaLnBrk="1" latinLnBrk="0" hangingPunct="1">
         <a:spcBef>
           <a:spcPct val="20000"/>
         </a:spcBef>
         <a:buFont typeface="Arial" panose="020B0604020202020204" pitchFamily="34" charset="0"/>
         <a:buChar char="•"/>
-        <a:defRPr sz="1800" kern="1200">
+        <a:defRPr sz="1900" kern="1200">
           <a:solidFill>
             <a:schemeClr val="tx1"/>
           </a:solidFill>
@@ -2983,8 +2983,8 @@
       <a:defPPr>
         <a:defRPr lang="fr-FR"/>
       </a:defPPr>
-      <a:lvl1pPr marL="0" algn="l" defTabSz="820717" rtl="0" eaLnBrk="1" latinLnBrk="0" hangingPunct="1">
-        <a:defRPr sz="1600" kern="1200">
+      <a:lvl1pPr marL="0" algn="l" defTabSz="836296" rtl="0" eaLnBrk="1" latinLnBrk="0" hangingPunct="1">
+        <a:defRPr sz="1700" kern="1200">
           <a:solidFill>
             <a:schemeClr val="tx1"/>
           </a:solidFill>
@@ -2993,8 +2993,8 @@
           <a:cs typeface="+mn-cs"/>
         </a:defRPr>
       </a:lvl1pPr>
-      <a:lvl2pPr marL="410359" algn="l" defTabSz="820717" rtl="0" eaLnBrk="1" latinLnBrk="0" hangingPunct="1">
-        <a:defRPr sz="1600" kern="1200">
+      <a:lvl2pPr marL="418149" algn="l" defTabSz="836296" rtl="0" eaLnBrk="1" latinLnBrk="0" hangingPunct="1">
+        <a:defRPr sz="1700" kern="1200">
           <a:solidFill>
             <a:schemeClr val="tx1"/>
           </a:solidFill>
@@ -3003,8 +3003,8 @@
           <a:cs typeface="+mn-cs"/>
         </a:defRPr>
       </a:lvl2pPr>
-      <a:lvl3pPr marL="820717" algn="l" defTabSz="820717" rtl="0" eaLnBrk="1" latinLnBrk="0" hangingPunct="1">
-        <a:defRPr sz="1600" kern="1200">
+      <a:lvl3pPr marL="836296" algn="l" defTabSz="836296" rtl="0" eaLnBrk="1" latinLnBrk="0" hangingPunct="1">
+        <a:defRPr sz="1700" kern="1200">
           <a:solidFill>
             <a:schemeClr val="tx1"/>
           </a:solidFill>
@@ -3013,8 +3013,8 @@
           <a:cs typeface="+mn-cs"/>
         </a:defRPr>
       </a:lvl3pPr>
-      <a:lvl4pPr marL="1231076" algn="l" defTabSz="820717" rtl="0" eaLnBrk="1" latinLnBrk="0" hangingPunct="1">
-        <a:defRPr sz="1600" kern="1200">
+      <a:lvl4pPr marL="1254444" algn="l" defTabSz="836296" rtl="0" eaLnBrk="1" latinLnBrk="0" hangingPunct="1">
+        <a:defRPr sz="1700" kern="1200">
           <a:solidFill>
             <a:schemeClr val="tx1"/>
           </a:solidFill>
@@ -3023,8 +3023,8 @@
           <a:cs typeface="+mn-cs"/>
         </a:defRPr>
       </a:lvl4pPr>
-      <a:lvl5pPr marL="1641434" algn="l" defTabSz="820717" rtl="0" eaLnBrk="1" latinLnBrk="0" hangingPunct="1">
-        <a:defRPr sz="1600" kern="1200">
+      <a:lvl5pPr marL="1672592" algn="l" defTabSz="836296" rtl="0" eaLnBrk="1" latinLnBrk="0" hangingPunct="1">
+        <a:defRPr sz="1700" kern="1200">
           <a:solidFill>
             <a:schemeClr val="tx1"/>
           </a:solidFill>
@@ -3033,8 +3033,8 @@
           <a:cs typeface="+mn-cs"/>
         </a:defRPr>
       </a:lvl5pPr>
-      <a:lvl6pPr marL="2051793" algn="l" defTabSz="820717" rtl="0" eaLnBrk="1" latinLnBrk="0" hangingPunct="1">
-        <a:defRPr sz="1600" kern="1200">
+      <a:lvl6pPr marL="2090740" algn="l" defTabSz="836296" rtl="0" eaLnBrk="1" latinLnBrk="0" hangingPunct="1">
+        <a:defRPr sz="1700" kern="1200">
           <a:solidFill>
             <a:schemeClr val="tx1"/>
           </a:solidFill>
@@ -3043,8 +3043,8 @@
           <a:cs typeface="+mn-cs"/>
         </a:defRPr>
       </a:lvl6pPr>
-      <a:lvl7pPr marL="2462152" algn="l" defTabSz="820717" rtl="0" eaLnBrk="1" latinLnBrk="0" hangingPunct="1">
-        <a:defRPr sz="1600" kern="1200">
+      <a:lvl7pPr marL="2508889" algn="l" defTabSz="836296" rtl="0" eaLnBrk="1" latinLnBrk="0" hangingPunct="1">
+        <a:defRPr sz="1700" kern="1200">
           <a:solidFill>
             <a:schemeClr val="tx1"/>
           </a:solidFill>
@@ -3053,8 +3053,8 @@
           <a:cs typeface="+mn-cs"/>
         </a:defRPr>
       </a:lvl7pPr>
-      <a:lvl8pPr marL="2872511" algn="l" defTabSz="820717" rtl="0" eaLnBrk="1" latinLnBrk="0" hangingPunct="1">
-        <a:defRPr sz="1600" kern="1200">
+      <a:lvl8pPr marL="2927036" algn="l" defTabSz="836296" rtl="0" eaLnBrk="1" latinLnBrk="0" hangingPunct="1">
+        <a:defRPr sz="1700" kern="1200">
           <a:solidFill>
             <a:schemeClr val="tx1"/>
           </a:solidFill>
@@ -3063,8 +3063,8 @@
           <a:cs typeface="+mn-cs"/>
         </a:defRPr>
       </a:lvl8pPr>
-      <a:lvl9pPr marL="3282870" algn="l" defTabSz="820717" rtl="0" eaLnBrk="1" latinLnBrk="0" hangingPunct="1">
-        <a:defRPr sz="1600" kern="1200">
+      <a:lvl9pPr marL="3345185" algn="l" defTabSz="836296" rtl="0" eaLnBrk="1" latinLnBrk="0" hangingPunct="1">
+        <a:defRPr sz="1700" kern="1200">
           <a:solidFill>
             <a:schemeClr val="tx1"/>
           </a:solidFill>
@@ -3097,7 +3097,7 @@
       </p:grpSpPr>
       <p:pic>
         <p:nvPicPr>
-          <p:cNvPr id="212" name="Picture 11"/>
+          <p:cNvPr id="113" name="Picture 15"/>
           <p:cNvPicPr>
             <a:picLocks noChangeAspect="1" noChangeArrowheads="1"/>
           </p:cNvPicPr>
@@ -3118,8 +3118,8 @@
         </p:blipFill>
         <p:spPr bwMode="auto">
           <a:xfrm>
-            <a:off x="6189258" y="5002515"/>
-            <a:ext cx="3316022" cy="4392000"/>
+            <a:off x="3024000" y="439200"/>
+            <a:ext cx="3446462" cy="4692650"/>
           </a:xfrm>
           <a:prstGeom prst="rect">
             <a:avLst/>
@@ -3151,13 +3151,13 @@
       </p:pic>
       <p:pic>
         <p:nvPicPr>
-          <p:cNvPr id="195" name="Picture 8"/>
+          <p:cNvPr id="1028" name="Picture 4"/>
           <p:cNvPicPr>
             <a:picLocks noChangeAspect="1" noChangeArrowheads="1"/>
           </p:cNvPicPr>
           <p:nvPr/>
         </p:nvPicPr>
-        <p:blipFill>
+        <p:blipFill rotWithShape="1">
           <a:blip r:embed="rId3">
             <a:extLst>
               <a:ext uri="{28A0092B-C50C-407E-A947-70E740481C1C}">
@@ -3165,15 +3165,13 @@
               </a:ext>
             </a:extLst>
           </a:blip>
-          <a:srcRect/>
-          <a:stretch>
-            <a:fillRect/>
-          </a:stretch>
+          <a:srcRect l="3449"/>
+          <a:stretch/>
         </p:blipFill>
         <p:spPr bwMode="auto">
           <a:xfrm>
-            <a:off x="3059832" y="610515"/>
-            <a:ext cx="3316022" cy="4392000"/>
+            <a:off x="6303600" y="608400"/>
+            <a:ext cx="3416483" cy="4576763"/>
           </a:xfrm>
           <a:prstGeom prst="rect">
             <a:avLst/>
@@ -3205,7 +3203,7 @@
       </p:pic>
       <p:pic>
         <p:nvPicPr>
-          <p:cNvPr id="196" name="Picture 10"/>
+          <p:cNvPr id="112" name="Picture 24"/>
           <p:cNvPicPr>
             <a:picLocks noChangeAspect="1" noChangeArrowheads="1"/>
           </p:cNvPicPr>
@@ -3226,8 +3224,112 @@
         </p:blipFill>
         <p:spPr bwMode="auto">
           <a:xfrm>
-            <a:off x="6156000" y="606898"/>
-            <a:ext cx="3308078" cy="4395600"/>
+            <a:off x="3037977" y="5002489"/>
+            <a:ext cx="3420000" cy="4646807"/>
+          </a:xfrm>
+          <a:prstGeom prst="rect">
+            <a:avLst/>
+          </a:prstGeom>
+          <a:noFill/>
+          <a:ln>
+            <a:noFill/>
+          </a:ln>
+          <a:extLst>
+            <a:ext uri="{909E8E84-426E-40DD-AFC4-6F175D3DCCD1}">
+              <a14:hiddenFill xmlns:a14="http://schemas.microsoft.com/office/drawing/2010/main">
+                <a:solidFill>
+                  <a:schemeClr val="accent1"/>
+                </a:solidFill>
+              </a14:hiddenFill>
+            </a:ext>
+            <a:ext uri="{91240B29-F687-4F45-9708-019B960494DF}">
+              <a14:hiddenLine xmlns:a14="http://schemas.microsoft.com/office/drawing/2010/main" w="9525">
+                <a:solidFill>
+                  <a:schemeClr val="tx1"/>
+                </a:solidFill>
+                <a:miter lim="800000"/>
+                <a:headEnd/>
+                <a:tailEnd/>
+              </a14:hiddenLine>
+            </a:ext>
+          </a:extLst>
+        </p:spPr>
+      </p:pic>
+      <p:pic>
+        <p:nvPicPr>
+          <p:cNvPr id="1027" name="Picture 3"/>
+          <p:cNvPicPr>
+            <a:picLocks noChangeAspect="1" noChangeArrowheads="1"/>
+          </p:cNvPicPr>
+          <p:nvPr/>
+        </p:nvPicPr>
+        <p:blipFill rotWithShape="1">
+          <a:blip r:embed="rId5">
+            <a:extLst>
+              <a:ext uri="{28A0092B-C50C-407E-A947-70E740481C1C}">
+                <a14:useLocalDpi xmlns:a14="http://schemas.microsoft.com/office/drawing/2010/main" val="0"/>
+              </a:ext>
+            </a:extLst>
+          </a:blip>
+          <a:srcRect l="3236"/>
+          <a:stretch/>
+        </p:blipFill>
+        <p:spPr bwMode="auto">
+          <a:xfrm>
+            <a:off x="6303600" y="5119200"/>
+            <a:ext cx="3410220" cy="4562475"/>
+          </a:xfrm>
+          <a:prstGeom prst="rect">
+            <a:avLst/>
+          </a:prstGeom>
+          <a:noFill/>
+          <a:ln>
+            <a:noFill/>
+          </a:ln>
+          <a:extLst>
+            <a:ext uri="{909E8E84-426E-40DD-AFC4-6F175D3DCCD1}">
+              <a14:hiddenFill xmlns:a14="http://schemas.microsoft.com/office/drawing/2010/main">
+                <a:solidFill>
+                  <a:schemeClr val="accent1"/>
+                </a:solidFill>
+              </a14:hiddenFill>
+            </a:ext>
+            <a:ext uri="{91240B29-F687-4F45-9708-019B960494DF}">
+              <a14:hiddenLine xmlns:a14="http://schemas.microsoft.com/office/drawing/2010/main" w="9525">
+                <a:solidFill>
+                  <a:schemeClr val="tx1"/>
+                </a:solidFill>
+                <a:miter lim="800000"/>
+                <a:headEnd/>
+                <a:tailEnd/>
+              </a14:hiddenLine>
+            </a:ext>
+          </a:extLst>
+        </p:spPr>
+      </p:pic>
+      <p:pic>
+        <p:nvPicPr>
+          <p:cNvPr id="116" name="Picture 2"/>
+          <p:cNvPicPr>
+            <a:picLocks noChangeAspect="1" noChangeArrowheads="1"/>
+          </p:cNvPicPr>
+          <p:nvPr/>
+        </p:nvPicPr>
+        <p:blipFill rotWithShape="1">
+          <a:blip r:embed="rId6" cstate="print">
+            <a:extLst>
+              <a:ext uri="{28A0092B-C50C-407E-A947-70E740481C1C}">
+                <a14:useLocalDpi xmlns:a14="http://schemas.microsoft.com/office/drawing/2010/main" val="0"/>
+              </a:ext>
+            </a:extLst>
+          </a:blip>
+          <a:srcRect l="13304" t="3491" r="7824" b="86269"/>
+          <a:stretch/>
+        </p:blipFill>
+        <p:spPr bwMode="auto">
+          <a:xfrm>
+            <a:off x="3581219" y="-36000"/>
+            <a:ext cx="2540794" cy="457201"/>
           </a:xfrm>
           <a:prstGeom prst="rect">
             <a:avLst/>
@@ -3259,529 +3361,179 @@
       </p:pic>
       <p:grpSp>
         <p:nvGrpSpPr>
-          <p:cNvPr id="197" name="Groupe 196"/>
-          <p:cNvGrpSpPr/>
+          <p:cNvPr id="117" name="Groupe 116"/>
+          <p:cNvGrpSpPr>
+            <a:grpSpLocks noChangeAspect="1"/>
+          </p:cNvGrpSpPr>
           <p:nvPr/>
         </p:nvGrpSpPr>
         <p:grpSpPr>
           <a:xfrm>
-            <a:off x="0" y="-36000"/>
-            <a:ext cx="3221465" cy="4993705"/>
-            <a:chOff x="0" y="-36000"/>
-            <a:chExt cx="3221465" cy="4993705"/>
+            <a:off x="3570603" y="619289"/>
+            <a:ext cx="1429655" cy="1152000"/>
+            <a:chOff x="307540" y="751587"/>
+            <a:chExt cx="2041660" cy="1698173"/>
           </a:xfrm>
         </p:grpSpPr>
-        <p:grpSp>
-          <p:nvGrpSpPr>
-            <p:cNvPr id="198" name="Groupe 197"/>
-            <p:cNvGrpSpPr/>
+        <p:pic>
+          <p:nvPicPr>
+            <p:cNvPr id="118" name="Image 117"/>
+            <p:cNvPicPr>
+              <a:picLocks noChangeAspect="1"/>
+            </p:cNvPicPr>
             <p:nvPr/>
-          </p:nvGrpSpPr>
-          <p:grpSpPr>
-            <a:xfrm>
-              <a:off x="0" y="-36000"/>
-              <a:ext cx="3221465" cy="4993705"/>
-              <a:chOff x="0" y="595535"/>
-              <a:chExt cx="3221465" cy="4993705"/>
-            </a:xfrm>
-          </p:grpSpPr>
-          <p:pic>
-            <p:nvPicPr>
-              <p:cNvPr id="200" name="Picture 2"/>
-              <p:cNvPicPr>
-                <a:picLocks noChangeAspect="1" noChangeArrowheads="1"/>
-              </p:cNvPicPr>
-              <p:nvPr/>
-            </p:nvPicPr>
-            <p:blipFill>
-              <a:blip r:embed="rId5" cstate="print">
-                <a:extLst>
-                  <a:ext uri="{28A0092B-C50C-407E-A947-70E740481C1C}">
-                    <a14:useLocalDpi xmlns:a14="http://schemas.microsoft.com/office/drawing/2010/main" val="0"/>
-                  </a:ext>
-                </a:extLst>
-              </a:blip>
-              <a:srcRect/>
-              <a:stretch>
-                <a:fillRect/>
-              </a:stretch>
-            </p:blipFill>
-            <p:spPr bwMode="auto">
-              <a:xfrm>
-                <a:off x="0" y="1124403"/>
-                <a:ext cx="3221465" cy="4464837"/>
-              </a:xfrm>
-              <a:prstGeom prst="rect">
-                <a:avLst/>
-              </a:prstGeom>
-              <a:noFill/>
-              <a:ln>
-                <a:noFill/>
-              </a:ln>
+          </p:nvPicPr>
+          <p:blipFill rotWithShape="1">
+            <a:blip r:embed="rId7" cstate="print">
               <a:extLst>
-                <a:ext uri="{909E8E84-426E-40DD-AFC4-6F175D3DCCD1}">
-                  <a14:hiddenFill xmlns:a14="http://schemas.microsoft.com/office/drawing/2010/main">
-                    <a:solidFill>
-                      <a:schemeClr val="accent1"/>
-                    </a:solidFill>
-                  </a14:hiddenFill>
-                </a:ext>
-                <a:ext uri="{91240B29-F687-4F45-9708-019B960494DF}">
-                  <a14:hiddenLine xmlns:a14="http://schemas.microsoft.com/office/drawing/2010/main" w="9525">
-                    <a:solidFill>
-                      <a:schemeClr val="tx1"/>
-                    </a:solidFill>
-                    <a:miter lim="800000"/>
-                    <a:headEnd/>
-                    <a:tailEnd/>
-                  </a14:hiddenLine>
+                <a:ext uri="{28A0092B-C50C-407E-A947-70E740481C1C}">
+                  <a14:useLocalDpi xmlns:a14="http://schemas.microsoft.com/office/drawing/2010/main" val="0"/>
                 </a:ext>
               </a:extLst>
-            </p:spPr>
-          </p:pic>
-          <p:pic>
-            <p:nvPicPr>
-              <p:cNvPr id="201" name="Picture 2"/>
-              <p:cNvPicPr>
-                <a:picLocks noChangeAspect="1" noChangeArrowheads="1"/>
-              </p:cNvPicPr>
-              <p:nvPr/>
-            </p:nvPicPr>
-            <p:blipFill rotWithShape="1">
-              <a:blip r:embed="rId5" cstate="print">
-                <a:extLst>
-                  <a:ext uri="{28A0092B-C50C-407E-A947-70E740481C1C}">
-                    <a14:useLocalDpi xmlns:a14="http://schemas.microsoft.com/office/drawing/2010/main" val="0"/>
-                  </a:ext>
-                </a:extLst>
-              </a:blip>
-              <a:srcRect l="13304" t="3491" r="7824" b="86269"/>
-              <a:stretch/>
-            </p:blipFill>
-            <p:spPr bwMode="auto">
-              <a:xfrm>
-                <a:off x="428626" y="595535"/>
-                <a:ext cx="2540794" cy="457201"/>
-              </a:xfrm>
-              <a:prstGeom prst="rect">
-                <a:avLst/>
-              </a:prstGeom>
-              <a:noFill/>
-              <a:ln>
-                <a:noFill/>
-              </a:ln>
-              <a:extLst>
-                <a:ext uri="{909E8E84-426E-40DD-AFC4-6F175D3DCCD1}">
-                  <a14:hiddenFill xmlns:a14="http://schemas.microsoft.com/office/drawing/2010/main">
-                    <a:solidFill>
-                      <a:schemeClr val="accent1"/>
-                    </a:solidFill>
-                  </a14:hiddenFill>
-                </a:ext>
-                <a:ext uri="{91240B29-F687-4F45-9708-019B960494DF}">
-                  <a14:hiddenLine xmlns:a14="http://schemas.microsoft.com/office/drawing/2010/main" w="9525">
-                    <a:solidFill>
-                      <a:schemeClr val="tx1"/>
-                    </a:solidFill>
-                    <a:miter lim="800000"/>
-                    <a:headEnd/>
-                    <a:tailEnd/>
-                  </a14:hiddenLine>
-                </a:ext>
-              </a:extLst>
-            </p:spPr>
-          </p:pic>
-          <p:sp>
-            <p:nvSpPr>
-              <p:cNvPr id="202" name="Rectangle 201"/>
-              <p:cNvSpPr/>
-              <p:nvPr/>
-            </p:nvSpPr>
-            <p:spPr>
-              <a:xfrm>
-                <a:off x="435600" y="1332000"/>
-                <a:ext cx="2523600" cy="360040"/>
-              </a:xfrm>
-              <a:prstGeom prst="rect">
-                <a:avLst/>
-              </a:prstGeom>
-              <a:solidFill>
-                <a:schemeClr val="bg1"/>
-              </a:solidFill>
-              <a:ln>
-                <a:solidFill>
-                  <a:schemeClr val="bg1"/>
-                </a:solidFill>
-              </a:ln>
-            </p:spPr>
-            <p:style>
-              <a:lnRef idx="2">
-                <a:schemeClr val="accent1">
-                  <a:shade val="50000"/>
-                </a:schemeClr>
-              </a:lnRef>
-              <a:fillRef idx="1">
-                <a:schemeClr val="accent1"/>
-              </a:fillRef>
-              <a:effectRef idx="0">
-                <a:schemeClr val="accent1"/>
-              </a:effectRef>
-              <a:fontRef idx="minor">
-                <a:schemeClr val="lt1"/>
-              </a:fontRef>
-            </p:style>
-            <p:txBody>
-              <a:bodyPr rtlCol="0" anchor="ctr"/>
-              <a:lstStyle/>
-              <a:p>
-                <a:pPr algn="ctr"/>
-                <a:endParaRPr lang="fr-FR"/>
-              </a:p>
-            </p:txBody>
-          </p:sp>
-          <p:cxnSp>
-            <p:nvCxnSpPr>
-              <p:cNvPr id="203" name="Connecteur droit 202"/>
-              <p:cNvCxnSpPr/>
-              <p:nvPr/>
-            </p:nvCxnSpPr>
-            <p:spPr>
-              <a:xfrm>
-                <a:off x="417600" y="1268760"/>
-                <a:ext cx="0" cy="576064"/>
-              </a:xfrm>
-              <a:prstGeom prst="line">
-                <a:avLst/>
-              </a:prstGeom>
-              <a:ln>
-                <a:solidFill>
-                  <a:schemeClr val="tx1"/>
-                </a:solidFill>
-              </a:ln>
-            </p:spPr>
-            <p:style>
-              <a:lnRef idx="1">
-                <a:schemeClr val="accent1"/>
-              </a:lnRef>
-              <a:fillRef idx="0">
-                <a:schemeClr val="accent1"/>
-              </a:fillRef>
-              <a:effectRef idx="0">
-                <a:schemeClr val="accent1"/>
-              </a:effectRef>
-              <a:fontRef idx="minor">
-                <a:schemeClr val="tx1"/>
-              </a:fontRef>
-            </p:style>
-          </p:cxnSp>
-          <p:cxnSp>
-            <p:nvCxnSpPr>
-              <p:cNvPr id="204" name="Connecteur droit 203"/>
-              <p:cNvCxnSpPr/>
-              <p:nvPr/>
-            </p:nvCxnSpPr>
-            <p:spPr>
-              <a:xfrm>
-                <a:off x="2977200" y="1267200"/>
-                <a:ext cx="0" cy="576064"/>
-              </a:xfrm>
-              <a:prstGeom prst="line">
-                <a:avLst/>
-              </a:prstGeom>
-              <a:ln>
-                <a:solidFill>
-                  <a:schemeClr val="tx1"/>
-                </a:solidFill>
-              </a:ln>
-            </p:spPr>
-            <p:style>
-              <a:lnRef idx="1">
-                <a:schemeClr val="accent1"/>
-              </a:lnRef>
-              <a:fillRef idx="0">
-                <a:schemeClr val="accent1"/>
-              </a:fillRef>
-              <a:effectRef idx="0">
-                <a:schemeClr val="accent1"/>
-              </a:effectRef>
-              <a:fontRef idx="minor">
-                <a:schemeClr val="tx1"/>
-              </a:fontRef>
-            </p:style>
-          </p:cxnSp>
-          <p:grpSp>
-            <p:nvGrpSpPr>
-              <p:cNvPr id="205" name="Groupe 204"/>
-              <p:cNvGrpSpPr>
-                <a:grpSpLocks noChangeAspect="1"/>
-              </p:cNvGrpSpPr>
-              <p:nvPr/>
-            </p:nvGrpSpPr>
-            <p:grpSpPr>
-              <a:xfrm>
-                <a:off x="418009" y="1250824"/>
-                <a:ext cx="1474332" cy="1188000"/>
-                <a:chOff x="307540" y="751587"/>
-                <a:chExt cx="2041660" cy="1698173"/>
-              </a:xfrm>
-            </p:grpSpPr>
-            <p:pic>
-              <p:nvPicPr>
-                <p:cNvPr id="208" name="Image 207"/>
-                <p:cNvPicPr>
-                  <a:picLocks noChangeAspect="1"/>
-                </p:cNvPicPr>
-                <p:nvPr/>
-              </p:nvPicPr>
-              <p:blipFill rotWithShape="1">
-                <a:blip r:embed="rId6" cstate="print">
-                  <a:extLst>
-                    <a:ext uri="{28A0092B-C50C-407E-A947-70E740481C1C}">
-                      <a14:useLocalDpi xmlns:a14="http://schemas.microsoft.com/office/drawing/2010/main" val="0"/>
-                    </a:ext>
-                  </a:extLst>
-                </a:blip>
-                <a:srcRect l="28993" t="26566" r="26002" b="23523"/>
-                <a:stretch/>
-              </p:blipFill>
-              <p:spPr>
-                <a:xfrm>
-                  <a:off x="307540" y="751587"/>
-                  <a:ext cx="2041660" cy="1698173"/>
-                </a:xfrm>
-                <a:prstGeom prst="rect">
-                  <a:avLst/>
-                </a:prstGeom>
-              </p:spPr>
-            </p:pic>
-            <p:cxnSp>
-              <p:nvCxnSpPr>
-                <p:cNvPr id="209" name="Connecteur droit 208"/>
-                <p:cNvCxnSpPr/>
-                <p:nvPr/>
-              </p:nvCxnSpPr>
-              <p:spPr>
-                <a:xfrm>
-                  <a:off x="1130961" y="1488430"/>
-                  <a:ext cx="416703" cy="0"/>
-                </a:xfrm>
-                <a:prstGeom prst="line">
-                  <a:avLst/>
-                </a:prstGeom>
-              </p:spPr>
-              <p:style>
-                <a:lnRef idx="1">
-                  <a:schemeClr val="accent1"/>
-                </a:lnRef>
-                <a:fillRef idx="0">
-                  <a:schemeClr val="accent1"/>
-                </a:fillRef>
-                <a:effectRef idx="0">
-                  <a:schemeClr val="accent1"/>
-                </a:effectRef>
-                <a:fontRef idx="minor">
-                  <a:schemeClr val="tx1"/>
-                </a:fontRef>
-              </p:style>
-            </p:cxnSp>
-            <p:sp>
-              <p:nvSpPr>
-                <p:cNvPr id="210" name="ZoneTexte 209"/>
-                <p:cNvSpPr txBox="1"/>
-                <p:nvPr/>
-              </p:nvSpPr>
-              <p:spPr>
-                <a:xfrm>
-                  <a:off x="1024855" y="1150652"/>
-                  <a:ext cx="508474" cy="276999"/>
-                </a:xfrm>
-                <a:prstGeom prst="rect">
-                  <a:avLst/>
-                </a:prstGeom>
-                <a:noFill/>
-              </p:spPr>
-              <p:txBody>
-                <a:bodyPr wrap="none" rtlCol="0">
-                  <a:spAutoFit/>
-                </a:bodyPr>
-                <a:lstStyle/>
-                <a:p>
-                  <a:r>
-                    <a:rPr lang="fr-FR" sz="1200" dirty="0" smtClean="0">
-                      <a:solidFill>
-                        <a:schemeClr val="bg1"/>
-                      </a:solidFill>
-                      <a:latin typeface="Times New Roman" panose="02020603050405020304" pitchFamily="18" charset="0"/>
-                      <a:cs typeface="Times New Roman" panose="02020603050405020304" pitchFamily="18" charset="0"/>
-                    </a:rPr>
-                    <a:t>4 µm</a:t>
-                  </a:r>
-                  <a:endParaRPr lang="en-US" sz="1200" dirty="0">
-                    <a:solidFill>
-                      <a:schemeClr val="bg1"/>
-                    </a:solidFill>
-                    <a:latin typeface="Times New Roman" panose="02020603050405020304" pitchFamily="18" charset="0"/>
-                    <a:cs typeface="Times New Roman" panose="02020603050405020304" pitchFamily="18" charset="0"/>
-                  </a:endParaRPr>
-                </a:p>
-              </p:txBody>
-            </p:sp>
-          </p:grpSp>
-          <p:sp>
-            <p:nvSpPr>
-              <p:cNvPr id="206" name="Rectangle 205"/>
-              <p:cNvSpPr/>
-              <p:nvPr/>
-            </p:nvSpPr>
-            <p:spPr>
-              <a:xfrm>
-                <a:off x="900000" y="2466000"/>
-                <a:ext cx="992341" cy="260920"/>
-              </a:xfrm>
-              <a:prstGeom prst="rect">
-                <a:avLst/>
-              </a:prstGeom>
-              <a:solidFill>
-                <a:schemeClr val="bg1"/>
-              </a:solidFill>
-              <a:ln>
-                <a:solidFill>
-                  <a:schemeClr val="bg1"/>
-                </a:solidFill>
-              </a:ln>
-            </p:spPr>
-            <p:style>
-              <a:lnRef idx="2">
-                <a:schemeClr val="accent1">
-                  <a:shade val="50000"/>
-                </a:schemeClr>
-              </a:lnRef>
-              <a:fillRef idx="1">
-                <a:schemeClr val="accent1"/>
-              </a:fillRef>
-              <a:effectRef idx="0">
-                <a:schemeClr val="accent1"/>
-              </a:effectRef>
-              <a:fontRef idx="minor">
-                <a:schemeClr val="lt1"/>
-              </a:fontRef>
-            </p:style>
-            <p:txBody>
-              <a:bodyPr rtlCol="0" anchor="ctr"/>
-              <a:lstStyle/>
-              <a:p>
-                <a:pPr algn="ctr"/>
-                <a:endParaRPr lang="fr-FR"/>
-              </a:p>
-            </p:txBody>
-          </p:sp>
-          <p:sp>
-            <p:nvSpPr>
-              <p:cNvPr id="207" name="Rectangle 206"/>
-              <p:cNvSpPr/>
-              <p:nvPr/>
-            </p:nvSpPr>
-            <p:spPr>
-              <a:xfrm>
-                <a:off x="706682" y="3717032"/>
-                <a:ext cx="992341" cy="260920"/>
-              </a:xfrm>
-              <a:prstGeom prst="rect">
-                <a:avLst/>
-              </a:prstGeom>
-              <a:solidFill>
-                <a:schemeClr val="bg1"/>
-              </a:solidFill>
-              <a:ln>
-                <a:solidFill>
-                  <a:schemeClr val="bg1"/>
-                </a:solidFill>
-              </a:ln>
-            </p:spPr>
-            <p:style>
-              <a:lnRef idx="2">
-                <a:schemeClr val="accent1">
-                  <a:shade val="50000"/>
-                </a:schemeClr>
-              </a:lnRef>
-              <a:fillRef idx="1">
-                <a:schemeClr val="accent1"/>
-              </a:fillRef>
-              <a:effectRef idx="0">
-                <a:schemeClr val="accent1"/>
-              </a:effectRef>
-              <a:fontRef idx="minor">
-                <a:schemeClr val="lt1"/>
-              </a:fontRef>
-            </p:style>
-            <p:txBody>
-              <a:bodyPr rtlCol="0" anchor="ctr"/>
-              <a:lstStyle/>
-              <a:p>
-                <a:pPr algn="ctr"/>
-                <a:endParaRPr lang="fr-FR"/>
-              </a:p>
-            </p:txBody>
-          </p:sp>
-        </p:grpSp>
-        <p:sp>
-          <p:nvSpPr>
-            <p:cNvPr id="199" name="Ellipse 198"/>
-            <p:cNvSpPr/>
-            <p:nvPr/>
-          </p:nvSpPr>
+            </a:blip>
+            <a:srcRect l="28993" t="26566" r="26002" b="23523"/>
+            <a:stretch/>
+          </p:blipFill>
           <p:spPr>
             <a:xfrm>
-              <a:off x="899592" y="4068456"/>
-              <a:ext cx="1080120" cy="648072"/>
+              <a:off x="307540" y="751587"/>
+              <a:ext cx="2041660" cy="1698173"/>
             </a:xfrm>
-            <a:prstGeom prst="ellipse">
+            <a:prstGeom prst="rect">
               <a:avLst/>
             </a:prstGeom>
-            <a:noFill/>
-            <a:ln>
-              <a:solidFill>
-                <a:srgbClr val="FF0000"/>
-              </a:solidFill>
-              <a:prstDash val="dash"/>
-            </a:ln>
+          </p:spPr>
+        </p:pic>
+        <p:cxnSp>
+          <p:nvCxnSpPr>
+            <p:cNvPr id="119" name="Connecteur droit 118"/>
+            <p:cNvCxnSpPr/>
+            <p:nvPr/>
+          </p:nvCxnSpPr>
+          <p:spPr>
+            <a:xfrm>
+              <a:off x="1130961" y="1488430"/>
+              <a:ext cx="416703" cy="0"/>
+            </a:xfrm>
+            <a:prstGeom prst="line">
+              <a:avLst/>
+            </a:prstGeom>
           </p:spPr>
           <p:style>
-            <a:lnRef idx="2">
-              <a:schemeClr val="accent1">
-                <a:shade val="50000"/>
-              </a:schemeClr>
+            <a:lnRef idx="1">
+              <a:schemeClr val="accent1"/>
             </a:lnRef>
-            <a:fillRef idx="1">
+            <a:fillRef idx="0">
               <a:schemeClr val="accent1"/>
             </a:fillRef>
             <a:effectRef idx="0">
               <a:schemeClr val="accent1"/>
             </a:effectRef>
             <a:fontRef idx="minor">
-              <a:schemeClr val="lt1"/>
+              <a:schemeClr val="tx1"/>
             </a:fontRef>
           </p:style>
+        </p:cxnSp>
+        <p:sp>
+          <p:nvSpPr>
+            <p:cNvPr id="120" name="ZoneTexte 119"/>
+            <p:cNvSpPr txBox="1"/>
+            <p:nvPr/>
+          </p:nvSpPr>
+          <p:spPr>
+            <a:xfrm>
+              <a:off x="1024855" y="1150652"/>
+              <a:ext cx="508474" cy="276999"/>
+            </a:xfrm>
+            <a:prstGeom prst="rect">
+              <a:avLst/>
+            </a:prstGeom>
+            <a:noFill/>
+          </p:spPr>
           <p:txBody>
-            <a:bodyPr rtlCol="0" anchor="ctr"/>
+            <a:bodyPr wrap="none" rtlCol="0">
+              <a:spAutoFit/>
+            </a:bodyPr>
             <a:lstStyle/>
             <a:p>
-              <a:pPr algn="ctr"/>
-              <a:endParaRPr lang="fr-FR"/>
+              <a:r>
+                <a:rPr lang="fr-FR" sz="1200" dirty="0" smtClean="0">
+                  <a:solidFill>
+                    <a:schemeClr val="bg1"/>
+                  </a:solidFill>
+                  <a:latin typeface="Times New Roman" panose="02020603050405020304" pitchFamily="18" charset="0"/>
+                  <a:cs typeface="Times New Roman" panose="02020603050405020304" pitchFamily="18" charset="0"/>
+                </a:rPr>
+                <a:t>4 µm</a:t>
+              </a:r>
+              <a:endParaRPr lang="en-US" sz="1200" dirty="0">
+                <a:solidFill>
+                  <a:schemeClr val="bg1"/>
+                </a:solidFill>
+                <a:latin typeface="Times New Roman" panose="02020603050405020304" pitchFamily="18" charset="0"/>
+                <a:cs typeface="Times New Roman" panose="02020603050405020304" pitchFamily="18" charset="0"/>
+              </a:endParaRPr>
             </a:p>
           </p:txBody>
         </p:sp>
       </p:grpSp>
+      <p:sp>
+        <p:nvSpPr>
+          <p:cNvPr id="121" name="Ellipse 120"/>
+          <p:cNvSpPr/>
+          <p:nvPr/>
+        </p:nvSpPr>
+        <p:spPr>
+          <a:xfrm>
+            <a:off x="3959592" y="4068456"/>
+            <a:ext cx="1080120" cy="648072"/>
+          </a:xfrm>
+          <a:prstGeom prst="ellipse">
+            <a:avLst/>
+          </a:prstGeom>
+          <a:noFill/>
+          <a:ln>
+            <a:solidFill>
+              <a:srgbClr val="FF0000"/>
+            </a:solidFill>
+            <a:prstDash val="dash"/>
+          </a:ln>
+        </p:spPr>
+        <p:style>
+          <a:lnRef idx="2">
+            <a:schemeClr val="accent1">
+              <a:shade val="50000"/>
+            </a:schemeClr>
+          </a:lnRef>
+          <a:fillRef idx="1">
+            <a:schemeClr val="accent1"/>
+          </a:fillRef>
+          <a:effectRef idx="0">
+            <a:schemeClr val="accent1"/>
+          </a:effectRef>
+          <a:fontRef idx="minor">
+            <a:schemeClr val="lt1"/>
+          </a:fontRef>
+        </p:style>
+        <p:txBody>
+          <a:bodyPr rtlCol="0" anchor="ctr"/>
+          <a:lstStyle/>
+          <a:p>
+            <a:pPr algn="ctr"/>
+            <a:endParaRPr lang="fr-FR"/>
+          </a:p>
+        </p:txBody>
+      </p:sp>
       <p:pic>
         <p:nvPicPr>
-          <p:cNvPr id="211" name="Image 210"/>
+          <p:cNvPr id="122" name="Image 121"/>
           <p:cNvPicPr>
             <a:picLocks noChangeAspect="1"/>
           </p:cNvPicPr>
           <p:nvPr/>
         </p:nvPicPr>
         <p:blipFill rotWithShape="1">
-          <a:blip r:embed="rId7" cstate="print">
+          <a:blip r:embed="rId8" cstate="print">
             <a:extLst>
               <a:ext uri="{28A0092B-C50C-407E-A947-70E740481C1C}">
                 <a14:useLocalDpi xmlns:a14="http://schemas.microsoft.com/office/drawing/2010/main" val="0"/>
@@ -3793,8 +3545,8 @@
         </p:blipFill>
         <p:spPr>
           <a:xfrm>
-            <a:off x="7737994" y="7309168"/>
-            <a:ext cx="1472869" cy="1188000"/>
+            <a:off x="3578974" y="5177633"/>
+            <a:ext cx="1428237" cy="1152000"/>
           </a:xfrm>
           <a:prstGeom prst="rect">
             <a:avLst/>
@@ -3803,13 +3555,49 @@
       </p:pic>
       <p:sp>
         <p:nvSpPr>
-          <p:cNvPr id="2" name="ZoneTexte 1"/>
+          <p:cNvPr id="124" name="ZoneTexte 123"/>
           <p:cNvSpPr txBox="1"/>
           <p:nvPr/>
         </p:nvSpPr>
         <p:spPr>
           <a:xfrm>
-            <a:off x="-71784" y="216248"/>
+            <a:off x="3045145" y="341660"/>
+            <a:ext cx="543739" cy="461665"/>
+          </a:xfrm>
+          <a:prstGeom prst="rect">
+            <a:avLst/>
+          </a:prstGeom>
+          <a:noFill/>
+        </p:spPr>
+        <p:txBody>
+          <a:bodyPr wrap="none" rtlCol="0">
+            <a:spAutoFit/>
+          </a:bodyPr>
+          <a:lstStyle/>
+          <a:p>
+            <a:r>
+              <a:rPr lang="fr-FR" sz="2400" dirty="0" smtClean="0">
+                <a:latin typeface="Times New Roman" panose="02020603050405020304" pitchFamily="18" charset="0"/>
+                <a:cs typeface="Times New Roman" panose="02020603050405020304" pitchFamily="18" charset="0"/>
+              </a:rPr>
+              <a:t>(b)</a:t>
+            </a:r>
+            <a:endParaRPr lang="fr-FR" sz="2400" dirty="0">
+              <a:latin typeface="Times New Roman" panose="02020603050405020304" pitchFamily="18" charset="0"/>
+              <a:cs typeface="Times New Roman" panose="02020603050405020304" pitchFamily="18" charset="0"/>
+            </a:endParaRPr>
+          </a:p>
+        </p:txBody>
+      </p:sp>
+      <p:sp>
+        <p:nvSpPr>
+          <p:cNvPr id="125" name="ZoneTexte 124"/>
+          <p:cNvSpPr txBox="1"/>
+          <p:nvPr/>
+        </p:nvSpPr>
+        <p:spPr>
+          <a:xfrm>
+            <a:off x="6386886" y="413668"/>
             <a:ext cx="526106" cy="461665"/>
           </a:xfrm>
           <a:prstGeom prst="rect">
@@ -3828,7 +3616,7 @@
                 <a:latin typeface="Times New Roman" panose="02020603050405020304" pitchFamily="18" charset="0"/>
                 <a:cs typeface="Times New Roman" panose="02020603050405020304" pitchFamily="18" charset="0"/>
               </a:rPr>
-              <a:t>(a)</a:t>
+              <a:t>(c)</a:t>
             </a:r>
             <a:endParaRPr lang="fr-FR" sz="2400" dirty="0">
               <a:latin typeface="Times New Roman" panose="02020603050405020304" pitchFamily="18" charset="0"/>
@@ -3839,13 +3627,49 @@
       </p:sp>
       <p:sp>
         <p:nvSpPr>
-          <p:cNvPr id="31" name="ZoneTexte 30"/>
+          <p:cNvPr id="127" name="ZoneTexte 126"/>
           <p:cNvSpPr txBox="1"/>
           <p:nvPr/>
         </p:nvSpPr>
         <p:spPr>
           <a:xfrm>
-            <a:off x="3146526" y="216248"/>
+            <a:off x="6408936" y="4896768"/>
+            <a:ext cx="526106" cy="461665"/>
+          </a:xfrm>
+          <a:prstGeom prst="rect">
+            <a:avLst/>
+          </a:prstGeom>
+          <a:noFill/>
+        </p:spPr>
+        <p:txBody>
+          <a:bodyPr wrap="none" rtlCol="0">
+            <a:spAutoFit/>
+          </a:bodyPr>
+          <a:lstStyle/>
+          <a:p>
+            <a:r>
+              <a:rPr lang="fr-FR" sz="2400" dirty="0" smtClean="0">
+                <a:latin typeface="Times New Roman" panose="02020603050405020304" pitchFamily="18" charset="0"/>
+                <a:cs typeface="Times New Roman" panose="02020603050405020304" pitchFamily="18" charset="0"/>
+              </a:rPr>
+              <a:t>(e)</a:t>
+            </a:r>
+            <a:endParaRPr lang="fr-FR" sz="2400" dirty="0">
+              <a:latin typeface="Times New Roman" panose="02020603050405020304" pitchFamily="18" charset="0"/>
+              <a:cs typeface="Times New Roman" panose="02020603050405020304" pitchFamily="18" charset="0"/>
+            </a:endParaRPr>
+          </a:p>
+        </p:txBody>
+      </p:sp>
+      <p:sp>
+        <p:nvSpPr>
+          <p:cNvPr id="128" name="ZoneTexte 127"/>
+          <p:cNvSpPr txBox="1"/>
+          <p:nvPr/>
+        </p:nvSpPr>
+        <p:spPr>
+          <a:xfrm>
+            <a:off x="3024560" y="4867151"/>
             <a:ext cx="543739" cy="461665"/>
           </a:xfrm>
           <a:prstGeom prst="rect">
@@ -3864,7 +3688,7 @@
                 <a:latin typeface="Times New Roman" panose="02020603050405020304" pitchFamily="18" charset="0"/>
                 <a:cs typeface="Times New Roman" panose="02020603050405020304" pitchFamily="18" charset="0"/>
               </a:rPr>
-              <a:t>(b)</a:t>
+              <a:t>(d)</a:t>
             </a:r>
             <a:endParaRPr lang="fr-FR" sz="2400" dirty="0">
               <a:latin typeface="Times New Roman" panose="02020603050405020304" pitchFamily="18" charset="0"/>
@@ -3875,13 +3699,112 @@
       </p:sp>
       <p:sp>
         <p:nvSpPr>
-          <p:cNvPr id="32" name="ZoneTexte 31"/>
+          <p:cNvPr id="129" name="Ellipse 128"/>
+          <p:cNvSpPr/>
+          <p:nvPr/>
+        </p:nvSpPr>
+        <p:spPr>
+          <a:xfrm>
+            <a:off x="3960664" y="8641184"/>
+            <a:ext cx="1080120" cy="648072"/>
+          </a:xfrm>
+          <a:prstGeom prst="ellipse">
+            <a:avLst/>
+          </a:prstGeom>
+          <a:noFill/>
+          <a:ln>
+            <a:solidFill>
+              <a:srgbClr val="FF0000"/>
+            </a:solidFill>
+            <a:prstDash val="dash"/>
+          </a:ln>
+        </p:spPr>
+        <p:style>
+          <a:lnRef idx="2">
+            <a:schemeClr val="accent1">
+              <a:shade val="50000"/>
+            </a:schemeClr>
+          </a:lnRef>
+          <a:fillRef idx="1">
+            <a:schemeClr val="accent1"/>
+          </a:fillRef>
+          <a:effectRef idx="0">
+            <a:schemeClr val="accent1"/>
+          </a:effectRef>
+          <a:fontRef idx="minor">
+            <a:schemeClr val="lt1"/>
+          </a:fontRef>
+        </p:style>
+        <p:txBody>
+          <a:bodyPr rtlCol="0" anchor="ctr"/>
+          <a:lstStyle/>
+          <a:p>
+            <a:pPr algn="ctr"/>
+            <a:endParaRPr lang="fr-FR"/>
+          </a:p>
+        </p:txBody>
+      </p:sp>
+      <p:pic>
+        <p:nvPicPr>
+          <p:cNvPr id="1026" name="Picture 2"/>
+          <p:cNvPicPr>
+            <a:picLocks noChangeAspect="1" noChangeArrowheads="1"/>
+          </p:cNvPicPr>
+          <p:nvPr/>
+        </p:nvPicPr>
+        <p:blipFill rotWithShape="1">
+          <a:blip r:embed="rId9">
+            <a:extLst>
+              <a:ext uri="{28A0092B-C50C-407E-A947-70E740481C1C}">
+                <a14:useLocalDpi xmlns:a14="http://schemas.microsoft.com/office/drawing/2010/main" val="0"/>
+              </a:ext>
+            </a:extLst>
+          </a:blip>
+          <a:srcRect r="8320"/>
+          <a:stretch/>
+        </p:blipFill>
+        <p:spPr bwMode="auto">
+          <a:xfrm>
+            <a:off x="-144000" y="608400"/>
+            <a:ext cx="3244155" cy="4576763"/>
+          </a:xfrm>
+          <a:prstGeom prst="rect">
+            <a:avLst/>
+          </a:prstGeom>
+          <a:noFill/>
+          <a:ln>
+            <a:noFill/>
+          </a:ln>
+          <a:extLst>
+            <a:ext uri="{909E8E84-426E-40DD-AFC4-6F175D3DCCD1}">
+              <a14:hiddenFill xmlns:a14="http://schemas.microsoft.com/office/drawing/2010/main">
+                <a:solidFill>
+                  <a:schemeClr val="accent1"/>
+                </a:solidFill>
+              </a14:hiddenFill>
+            </a:ext>
+            <a:ext uri="{91240B29-F687-4F45-9708-019B960494DF}">
+              <a14:hiddenLine xmlns:a14="http://schemas.microsoft.com/office/drawing/2010/main" w="9525">
+                <a:solidFill>
+                  <a:schemeClr val="tx1"/>
+                </a:solidFill>
+                <a:miter lim="800000"/>
+                <a:headEnd/>
+                <a:tailEnd/>
+              </a14:hiddenLine>
+            </a:ext>
+          </a:extLst>
+        </p:spPr>
+      </p:pic>
+      <p:sp>
+        <p:nvSpPr>
+          <p:cNvPr id="123" name="ZoneTexte 122"/>
           <p:cNvSpPr txBox="1"/>
           <p:nvPr/>
         </p:nvSpPr>
         <p:spPr>
           <a:xfrm>
-            <a:off x="6264920" y="216248"/>
+            <a:off x="67867" y="384051"/>
             <a:ext cx="526106" cy="461665"/>
           </a:xfrm>
           <a:prstGeom prst="rect">
@@ -3900,43 +3823,7 @@
                 <a:latin typeface="Times New Roman" panose="02020603050405020304" pitchFamily="18" charset="0"/>
                 <a:cs typeface="Times New Roman" panose="02020603050405020304" pitchFamily="18" charset="0"/>
               </a:rPr>
-              <a:t>(c)</a:t>
-            </a:r>
-            <a:endParaRPr lang="fr-FR" sz="2400" dirty="0">
-              <a:latin typeface="Times New Roman" panose="02020603050405020304" pitchFamily="18" charset="0"/>
-              <a:cs typeface="Times New Roman" panose="02020603050405020304" pitchFamily="18" charset="0"/>
-            </a:endParaRPr>
-          </a:p>
-        </p:txBody>
-      </p:sp>
-      <p:sp>
-        <p:nvSpPr>
-          <p:cNvPr id="33" name="ZoneTexte 32"/>
-          <p:cNvSpPr txBox="1"/>
-          <p:nvPr/>
-        </p:nvSpPr>
-        <p:spPr>
-          <a:xfrm>
-            <a:off x="6297834" y="4608736"/>
-            <a:ext cx="543739" cy="461665"/>
-          </a:xfrm>
-          <a:prstGeom prst="rect">
-            <a:avLst/>
-          </a:prstGeom>
-          <a:noFill/>
-        </p:spPr>
-        <p:txBody>
-          <a:bodyPr wrap="none" rtlCol="0">
-            <a:spAutoFit/>
-          </a:bodyPr>
-          <a:lstStyle/>
-          <a:p>
-            <a:r>
-              <a:rPr lang="fr-FR" sz="2400" dirty="0" smtClean="0">
-                <a:latin typeface="Times New Roman" panose="02020603050405020304" pitchFamily="18" charset="0"/>
-                <a:cs typeface="Times New Roman" panose="02020603050405020304" pitchFamily="18" charset="0"/>
-              </a:rPr>
-              <a:t>(d)</a:t>
+              <a:t>(a)</a:t>
             </a:r>
             <a:endParaRPr lang="fr-FR" sz="2400" dirty="0">
               <a:latin typeface="Times New Roman" panose="02020603050405020304" pitchFamily="18" charset="0"/>

</xml_diff>